<commit_message>
Moved tutorial to docs folder
</commit_message>
<xml_diff>
--- a/docs/wishbone_tutorial.pptx
+++ b/docs/wishbone_tutorial.pptx
@@ -15,16 +15,17 @@
     <p:sldId id="269" r:id="rId9"/>
     <p:sldId id="262" r:id="rId10"/>
     <p:sldId id="270" r:id="rId11"/>
-    <p:sldId id="263" r:id="rId12"/>
-    <p:sldId id="264" r:id="rId13"/>
-    <p:sldId id="271" r:id="rId14"/>
-    <p:sldId id="265" r:id="rId15"/>
-    <p:sldId id="274" r:id="rId16"/>
-    <p:sldId id="266" r:id="rId17"/>
-    <p:sldId id="267" r:id="rId18"/>
-    <p:sldId id="272" r:id="rId19"/>
-    <p:sldId id="275" r:id="rId20"/>
-    <p:sldId id="273" r:id="rId21"/>
+    <p:sldId id="276" r:id="rId12"/>
+    <p:sldId id="263" r:id="rId13"/>
+    <p:sldId id="264" r:id="rId14"/>
+    <p:sldId id="271" r:id="rId15"/>
+    <p:sldId id="265" r:id="rId16"/>
+    <p:sldId id="274" r:id="rId17"/>
+    <p:sldId id="266" r:id="rId18"/>
+    <p:sldId id="267" r:id="rId19"/>
+    <p:sldId id="272" r:id="rId20"/>
+    <p:sldId id="275" r:id="rId21"/>
+    <p:sldId id="273" r:id="rId22"/>
   </p:sldIdLst>
   <p:sldSz cx="9144000" cy="6858000" type="screen4x3"/>
   <p:notesSz cx="6858000" cy="9144000"/>
@@ -320,7 +321,7 @@
           <a:p>
             <a:fld id="{249D404F-B59E-3249-9345-AAE4E529CC32}" type="datetimeFigureOut">
               <a:rPr lang="en-US" smtClean="0"/>
-              <a:t>5/20/16</a:t>
+              <a:t>6/23/16</a:t>
             </a:fld>
             <a:endParaRPr lang="en-US"/>
           </a:p>
@@ -521,7 +522,7 @@
           <a:p>
             <a:fld id="{249D404F-B59E-3249-9345-AAE4E529CC32}" type="datetimeFigureOut">
               <a:rPr lang="en-US" smtClean="0"/>
-              <a:t>5/20/16</a:t>
+              <a:t>6/23/16</a:t>
             </a:fld>
             <a:endParaRPr lang="en-US"/>
           </a:p>
@@ -696,7 +697,7 @@
           <a:p>
             <a:fld id="{249D404F-B59E-3249-9345-AAE4E529CC32}" type="datetimeFigureOut">
               <a:rPr lang="en-US" smtClean="0"/>
-              <a:t>5/20/16</a:t>
+              <a:t>6/23/16</a:t>
             </a:fld>
             <a:endParaRPr lang="en-US"/>
           </a:p>
@@ -861,7 +862,7 @@
           <a:p>
             <a:fld id="{249D404F-B59E-3249-9345-AAE4E529CC32}" type="datetimeFigureOut">
               <a:rPr lang="en-US" smtClean="0"/>
-              <a:t>5/20/16</a:t>
+              <a:t>6/23/16</a:t>
             </a:fld>
             <a:endParaRPr lang="en-US"/>
           </a:p>
@@ -1109,7 +1110,7 @@
           <a:p>
             <a:fld id="{249D404F-B59E-3249-9345-AAE4E529CC32}" type="datetimeFigureOut">
               <a:rPr lang="en-US" smtClean="0"/>
-              <a:t>5/20/16</a:t>
+              <a:t>6/23/16</a:t>
             </a:fld>
             <a:endParaRPr lang="en-US"/>
           </a:p>
@@ -1427,7 +1428,7 @@
           <a:p>
             <a:fld id="{249D404F-B59E-3249-9345-AAE4E529CC32}" type="datetimeFigureOut">
               <a:rPr lang="en-US" smtClean="0"/>
-              <a:t>5/20/16</a:t>
+              <a:t>6/23/16</a:t>
             </a:fld>
             <a:endParaRPr lang="en-US"/>
           </a:p>
@@ -1893,7 +1894,7 @@
           <a:p>
             <a:fld id="{249D404F-B59E-3249-9345-AAE4E529CC32}" type="datetimeFigureOut">
               <a:rPr lang="en-US" smtClean="0"/>
-              <a:t>5/20/16</a:t>
+              <a:t>6/23/16</a:t>
             </a:fld>
             <a:endParaRPr lang="en-US"/>
           </a:p>
@@ -2041,7 +2042,7 @@
           <a:p>
             <a:fld id="{249D404F-B59E-3249-9345-AAE4E529CC32}" type="datetimeFigureOut">
               <a:rPr lang="en-US" smtClean="0"/>
-              <a:t>5/20/16</a:t>
+              <a:t>6/23/16</a:t>
             </a:fld>
             <a:endParaRPr lang="en-US"/>
           </a:p>
@@ -2131,7 +2132,7 @@
           <a:p>
             <a:fld id="{249D404F-B59E-3249-9345-AAE4E529CC32}" type="datetimeFigureOut">
               <a:rPr lang="en-US" smtClean="0"/>
-              <a:t>5/20/16</a:t>
+              <a:t>6/23/16</a:t>
             </a:fld>
             <a:endParaRPr lang="en-US"/>
           </a:p>
@@ -2405,7 +2406,7 @@
           <a:p>
             <a:fld id="{249D404F-B59E-3249-9345-AAE4E529CC32}" type="datetimeFigureOut">
               <a:rPr lang="en-US" smtClean="0"/>
-              <a:t>5/20/16</a:t>
+              <a:t>6/23/16</a:t>
             </a:fld>
             <a:endParaRPr lang="en-US"/>
           </a:p>
@@ -2711,7 +2712,7 @@
           <a:p>
             <a:fld id="{249D404F-B59E-3249-9345-AAE4E529CC32}" type="datetimeFigureOut">
               <a:rPr lang="en-US" smtClean="0"/>
-              <a:t>5/20/16</a:t>
+              <a:t>6/23/16</a:t>
             </a:fld>
             <a:endParaRPr lang="en-US"/>
           </a:p>
@@ -3009,7 +3010,7 @@
           <a:p>
             <a:fld id="{249D404F-B59E-3249-9345-AAE4E529CC32}" type="datetimeFigureOut">
               <a:rPr lang="en-US" smtClean="0"/>
-              <a:t>5/20/16</a:t>
+              <a:t>6/23/16</a:t>
             </a:fld>
             <a:endParaRPr lang="en-US"/>
           </a:p>
@@ -3589,6 +3590,219 @@
           <a:p>
             <a:r>
               <a:rPr lang="en-US" dirty="0" smtClean="0"/>
+              <a:t>Selecting gate for start cells</a:t>
+            </a:r>
+            <a:endParaRPr lang="en-US" dirty="0"/>
+          </a:p>
+        </p:txBody>
+      </p:sp>
+      <p:sp>
+        <p:nvSpPr>
+          <p:cNvPr id="3" name="Content Placeholder 2"/>
+          <p:cNvSpPr>
+            <a:spLocks noGrp="1"/>
+          </p:cNvSpPr>
+          <p:nvPr>
+            <p:ph idx="1"/>
+          </p:nvPr>
+        </p:nvSpPr>
+        <p:spPr>
+          <a:xfrm>
+            <a:off x="457200" y="1647488"/>
+            <a:ext cx="8386924" cy="4876800"/>
+          </a:xfrm>
+        </p:spPr>
+        <p:txBody>
+          <a:bodyPr/>
+          <a:lstStyle/>
+          <a:p>
+            <a:r>
+              <a:rPr lang="en-US" dirty="0" smtClean="0"/>
+              <a:t>A subset of cells can be selected on a t-SNE plot and saved as a gate to be used as the Wishbone starting point.</a:t>
+            </a:r>
+          </a:p>
+          <a:p>
+            <a:r>
+              <a:rPr lang="en-US" dirty="0" smtClean="0"/>
+              <a:t>After plotting t-SNE, select ‘Set gate’ from the visualization menu</a:t>
+            </a:r>
+          </a:p>
+        </p:txBody>
+      </p:sp>
+      <p:pic>
+        <p:nvPicPr>
+          <p:cNvPr id="4" name="Picture 3" descr="Screen Shot 2016-06-23 at 12.16.15 PM.png"/>
+          <p:cNvPicPr>
+            <a:picLocks noChangeAspect="1"/>
+          </p:cNvPicPr>
+          <p:nvPr/>
+        </p:nvPicPr>
+        <p:blipFill>
+          <a:blip r:embed="rId2">
+            <a:extLst>
+              <a:ext uri="{28A0092B-C50C-407E-A947-70E740481C1C}">
+                <a14:useLocalDpi xmlns:a14="http://schemas.microsoft.com/office/drawing/2010/main" val="0"/>
+              </a:ext>
+            </a:extLst>
+          </a:blip>
+          <a:stretch>
+            <a:fillRect/>
+          </a:stretch>
+        </p:blipFill>
+        <p:spPr>
+          <a:xfrm>
+            <a:off x="3122236" y="3407251"/>
+            <a:ext cx="1552922" cy="544885"/>
+          </a:xfrm>
+          <a:prstGeom prst="rect">
+            <a:avLst/>
+          </a:prstGeom>
+        </p:spPr>
+      </p:pic>
+      <p:pic>
+        <p:nvPicPr>
+          <p:cNvPr id="5" name="Picture 4" descr="Screen Shot 2016-06-23 at 12.16.32 PM.png"/>
+          <p:cNvPicPr>
+            <a:picLocks noChangeAspect="1"/>
+          </p:cNvPicPr>
+          <p:nvPr/>
+        </p:nvPicPr>
+        <p:blipFill>
+          <a:blip r:embed="rId3">
+            <a:extLst>
+              <a:ext uri="{28A0092B-C50C-407E-A947-70E740481C1C}">
+                <a14:useLocalDpi xmlns:a14="http://schemas.microsoft.com/office/drawing/2010/main" val="0"/>
+              </a:ext>
+            </a:extLst>
+          </a:blip>
+          <a:stretch>
+            <a:fillRect/>
+          </a:stretch>
+        </p:blipFill>
+        <p:spPr>
+          <a:xfrm>
+            <a:off x="4762731" y="3407251"/>
+            <a:ext cx="4151953" cy="2958268"/>
+          </a:xfrm>
+          <a:prstGeom prst="rect">
+            <a:avLst/>
+          </a:prstGeom>
+        </p:spPr>
+      </p:pic>
+      <p:sp>
+        <p:nvSpPr>
+          <p:cNvPr id="6" name="TextBox 5"/>
+          <p:cNvSpPr txBox="1"/>
+          <p:nvPr/>
+        </p:nvSpPr>
+        <p:spPr>
+          <a:xfrm>
+            <a:off x="474840" y="3298897"/>
+            <a:ext cx="2470996" cy="2585323"/>
+          </a:xfrm>
+          <a:prstGeom prst="rect">
+            <a:avLst/>
+          </a:prstGeom>
+          <a:noFill/>
+        </p:spPr>
+        <p:txBody>
+          <a:bodyPr wrap="square" rtlCol="0">
+            <a:spAutoFit/>
+          </a:bodyPr>
+          <a:lstStyle/>
+          <a:p>
+            <a:pPr marL="182880" indent="-182880">
+              <a:spcBef>
+                <a:spcPts val="576"/>
+              </a:spcBef>
+              <a:buClr>
+                <a:schemeClr val="accent1"/>
+              </a:buClr>
+              <a:buSzPct val="85000"/>
+              <a:buFont typeface="Arial"/>
+              <a:buChar char="•"/>
+            </a:pPr>
+            <a:r>
+              <a:rPr lang="en-US" sz="2400" dirty="0">
+                <a:latin typeface="Corbel"/>
+                <a:cs typeface="Corbel"/>
+              </a:rPr>
+              <a:t>Choose a name for the </a:t>
+            </a:r>
+            <a:r>
+              <a:rPr lang="en-US" sz="2400" dirty="0" smtClean="0">
+                <a:latin typeface="Corbel"/>
+                <a:cs typeface="Corbel"/>
+              </a:rPr>
+              <a:t>gate, then </a:t>
+            </a:r>
+            <a:r>
+              <a:rPr lang="en-US" sz="2400" dirty="0">
+                <a:latin typeface="Corbel"/>
+                <a:cs typeface="Corbel"/>
+              </a:rPr>
+              <a:t>drag your cursor to select a rectangular area to gate.</a:t>
+            </a:r>
+          </a:p>
+          <a:p>
+            <a:endParaRPr lang="en-US" dirty="0"/>
+          </a:p>
+        </p:txBody>
+      </p:sp>
+    </p:spTree>
+    <p:extLst>
+      <p:ext uri="{BB962C8B-B14F-4D97-AF65-F5344CB8AC3E}">
+        <p14:creationId xmlns:p14="http://schemas.microsoft.com/office/powerpoint/2010/main" val="2841279371"/>
+      </p:ext>
+    </p:extLst>
+  </p:cSld>
+  <p:clrMapOvr>
+    <a:masterClrMapping/>
+  </p:clrMapOvr>
+  <p:timing>
+    <p:tnLst>
+      <p:par>
+        <p:cTn xmlns:p14="http://schemas.microsoft.com/office/powerpoint/2010/main" id="1" dur="indefinite" restart="never" nodeType="tmRoot"/>
+      </p:par>
+    </p:tnLst>
+  </p:timing>
+</p:sld>
+</file>
+
+<file path=ppt/slides/slide12.xml><?xml version="1.0" encoding="utf-8"?>
+<p:sld xmlns:a="http://schemas.openxmlformats.org/drawingml/2006/main" xmlns:r="http://schemas.openxmlformats.org/officeDocument/2006/relationships" xmlns:p="http://schemas.openxmlformats.org/presentationml/2006/main">
+  <p:cSld>
+    <p:spTree>
+      <p:nvGrpSpPr>
+        <p:cNvPr id="1" name=""/>
+        <p:cNvGrpSpPr/>
+        <p:nvPr/>
+      </p:nvGrpSpPr>
+      <p:grpSpPr>
+        <a:xfrm>
+          <a:off x="0" y="0"/>
+          <a:ext cx="0" cy="0"/>
+          <a:chOff x="0" y="0"/>
+          <a:chExt cx="0" cy="0"/>
+        </a:xfrm>
+      </p:grpSpPr>
+      <p:sp>
+        <p:nvSpPr>
+          <p:cNvPr id="2" name="Title 1"/>
+          <p:cNvSpPr>
+            <a:spLocks noGrp="1"/>
+          </p:cNvSpPr>
+          <p:nvPr>
+            <p:ph type="title"/>
+          </p:nvPr>
+        </p:nvSpPr>
+        <p:spPr/>
+        <p:txBody>
+          <a:bodyPr/>
+          <a:lstStyle/>
+          <a:p>
+            <a:r>
+              <a:rPr lang="en-US" dirty="0" smtClean="0"/>
               <a:t>Diffusion map components</a:t>
             </a:r>
             <a:endParaRPr lang="en-US" dirty="0"/>
@@ -3695,7 +3909,7 @@
 </p:sld>
 </file>
 
-<file path=ppt/slides/slide12.xml><?xml version="1.0" encoding="utf-8"?>
+<file path=ppt/slides/slide13.xml><?xml version="1.0" encoding="utf-8"?>
 <p:sld xmlns:a="http://schemas.openxmlformats.org/drawingml/2006/main" xmlns:r="http://schemas.openxmlformats.org/officeDocument/2006/relationships" xmlns:p="http://schemas.openxmlformats.org/presentationml/2006/main">
   <p:cSld>
     <p:spTree>
@@ -3815,7 +4029,7 @@
 </p:sld>
 </file>
 
-<file path=ppt/slides/slide13.xml><?xml version="1.0" encoding="utf-8"?>
+<file path=ppt/slides/slide14.xml><?xml version="1.0" encoding="utf-8"?>
 <p:sld xmlns:a="http://schemas.openxmlformats.org/drawingml/2006/main" xmlns:r="http://schemas.openxmlformats.org/officeDocument/2006/relationships" xmlns:p="http://schemas.openxmlformats.org/presentationml/2006/main">
   <p:cSld>
     <p:spTree>
@@ -3918,10 +4132,17 @@
   <p:clrMapOvr>
     <a:masterClrMapping/>
   </p:clrMapOvr>
+  <p:timing>
+    <p:tnLst>
+      <p:par>
+        <p:cTn xmlns:p14="http://schemas.microsoft.com/office/powerpoint/2010/main" id="1" dur="indefinite" restart="never" nodeType="tmRoot"/>
+      </p:par>
+    </p:tnLst>
+  </p:timing>
 </p:sld>
 </file>
 
-<file path=ppt/slides/slide14.xml><?xml version="1.0" encoding="utf-8"?>
+<file path=ppt/slides/slide15.xml><?xml version="1.0" encoding="utf-8"?>
 <p:sld xmlns:a="http://schemas.openxmlformats.org/drawingml/2006/main" xmlns:r="http://schemas.openxmlformats.org/officeDocument/2006/relationships" xmlns:p="http://schemas.openxmlformats.org/presentationml/2006/main">
   <p:cSld>
     <p:spTree>
@@ -4111,7 +4332,7 @@
 </p:sld>
 </file>
 
-<file path=ppt/slides/slide15.xml><?xml version="1.0" encoding="utf-8"?>
+<file path=ppt/slides/slide16.xml><?xml version="1.0" encoding="utf-8"?>
 <p:sld xmlns:a="http://schemas.openxmlformats.org/drawingml/2006/main" xmlns:r="http://schemas.openxmlformats.org/officeDocument/2006/relationships" xmlns:p="http://schemas.openxmlformats.org/presentationml/2006/main">
   <p:cSld>
     <p:spTree>
@@ -4191,10 +4412,17 @@
   <p:clrMapOvr>
     <a:masterClrMapping/>
   </p:clrMapOvr>
+  <p:timing>
+    <p:tnLst>
+      <p:par>
+        <p:cTn xmlns:p14="http://schemas.microsoft.com/office/powerpoint/2010/main" id="1" dur="indefinite" restart="never" nodeType="tmRoot"/>
+      </p:par>
+    </p:tnLst>
+  </p:timing>
 </p:sld>
 </file>
 
-<file path=ppt/slides/slide16.xml><?xml version="1.0" encoding="utf-8"?>
+<file path=ppt/slides/slide17.xml><?xml version="1.0" encoding="utf-8"?>
 <p:sld xmlns:a="http://schemas.openxmlformats.org/drawingml/2006/main" xmlns:r="http://schemas.openxmlformats.org/officeDocument/2006/relationships" xmlns:p="http://schemas.openxmlformats.org/presentationml/2006/main">
   <p:cSld>
     <p:spTree>
@@ -4257,7 +4485,17 @@
           <a:p>
             <a:r>
               <a:rPr lang="en-US" dirty="0" smtClean="0"/>
-              <a:t>You will be prompted to enter a start cell, a k value for the construction of a k-nearest neighbors graph, which diffusion components to use,  the number of waypoints to use, and whether to compute branches in the trajectory.</a:t>
+              <a:t>You will be prompted to enter a start cell, a k value for the construction of a k-nearest neighbors graph, which diffusion components to use,  the number of waypoints to use, and whether to compute branches in the trajectory</a:t>
+            </a:r>
+            <a:r>
+              <a:rPr lang="en-US" dirty="0" smtClean="0"/>
+              <a:t>.</a:t>
+            </a:r>
+          </a:p>
+          <a:p>
+            <a:r>
+              <a:rPr lang="en-US" dirty="0" smtClean="0"/>
+              <a:t>The start cell can either be a manually selected cell or a pre-saved cell gate (a randomly selected cell within the gate will be used as the starting point). </a:t>
             </a:r>
             <a:endParaRPr lang="en-US" dirty="0"/>
           </a:p>
@@ -4265,7 +4503,7 @@
       </p:sp>
       <p:pic>
         <p:nvPicPr>
-          <p:cNvPr id="4" name="Picture 3" descr="Screen Shot 2016-04-28 at 12.03.01 PM.png"/>
+          <p:cNvPr id="5" name="Picture 4" descr="Screen Shot 2016-06-23 at 12.17.57 PM.png"/>
           <p:cNvPicPr>
             <a:picLocks noChangeAspect="1"/>
           </p:cNvPicPr>
@@ -4285,8 +4523,8 @@
         </p:blipFill>
         <p:spPr>
           <a:xfrm>
-            <a:off x="457200" y="3802837"/>
-            <a:ext cx="4675964" cy="2674163"/>
+            <a:off x="4321734" y="4735037"/>
+            <a:ext cx="4522386" cy="1971297"/>
           </a:xfrm>
           <a:prstGeom prst="rect">
             <a:avLst/>
@@ -4303,10 +4541,17 @@
   <p:clrMapOvr>
     <a:masterClrMapping/>
   </p:clrMapOvr>
+  <p:timing>
+    <p:tnLst>
+      <p:par>
+        <p:cTn xmlns:p14="http://schemas.microsoft.com/office/powerpoint/2010/main" id="1" dur="indefinite" restart="never" nodeType="tmRoot"/>
+      </p:par>
+    </p:tnLst>
+  </p:timing>
 </p:sld>
 </file>
 
-<file path=ppt/slides/slide17.xml><?xml version="1.0" encoding="utf-8"?>
+<file path=ppt/slides/slide18.xml><?xml version="1.0" encoding="utf-8"?>
 <p:sld xmlns:a="http://schemas.openxmlformats.org/drawingml/2006/main" xmlns:r="http://schemas.openxmlformats.org/officeDocument/2006/relationships" xmlns:p="http://schemas.openxmlformats.org/presentationml/2006/main">
   <p:cSld>
     <p:spTree>
@@ -4458,10 +4703,17 @@
   <p:clrMapOvr>
     <a:masterClrMapping/>
   </p:clrMapOvr>
+  <p:timing>
+    <p:tnLst>
+      <p:par>
+        <p:cTn xmlns:p14="http://schemas.microsoft.com/office/powerpoint/2010/main" id="1" dur="indefinite" restart="never" nodeType="tmRoot"/>
+      </p:par>
+    </p:tnLst>
+  </p:timing>
 </p:sld>
 </file>
 
-<file path=ppt/slides/slide18.xml><?xml version="1.0" encoding="utf-8"?>
+<file path=ppt/slides/slide19.xml><?xml version="1.0" encoding="utf-8"?>
 <p:sld xmlns:a="http://schemas.openxmlformats.org/drawingml/2006/main" xmlns:r="http://schemas.openxmlformats.org/officeDocument/2006/relationships" xmlns:p="http://schemas.openxmlformats.org/presentationml/2006/main">
   <p:cSld>
     <p:spTree>
@@ -4573,10 +4825,177 @@
   <p:clrMapOvr>
     <a:masterClrMapping/>
   </p:clrMapOvr>
+  <p:timing>
+    <p:tnLst>
+      <p:par>
+        <p:cTn xmlns:p14="http://schemas.microsoft.com/office/powerpoint/2010/main" id="1" dur="indefinite" restart="never" nodeType="tmRoot"/>
+      </p:par>
+    </p:tnLst>
+  </p:timing>
 </p:sld>
 </file>
 
-<file path=ppt/slides/slide19.xml><?xml version="1.0" encoding="utf-8"?>
+<file path=ppt/slides/slide2.xml><?xml version="1.0" encoding="utf-8"?>
+<p:sld xmlns:a="http://schemas.openxmlformats.org/drawingml/2006/main" xmlns:r="http://schemas.openxmlformats.org/officeDocument/2006/relationships" xmlns:p="http://schemas.openxmlformats.org/presentationml/2006/main">
+  <p:cSld>
+    <p:spTree>
+      <p:nvGrpSpPr>
+        <p:cNvPr id="1" name=""/>
+        <p:cNvGrpSpPr/>
+        <p:nvPr/>
+      </p:nvGrpSpPr>
+      <p:grpSpPr>
+        <a:xfrm>
+          <a:off x="0" y="0"/>
+          <a:ext cx="0" cy="0"/>
+          <a:chOff x="0" y="0"/>
+          <a:chExt cx="0" cy="0"/>
+        </a:xfrm>
+      </p:grpSpPr>
+      <p:sp>
+        <p:nvSpPr>
+          <p:cNvPr id="2" name="Title 1"/>
+          <p:cNvSpPr>
+            <a:spLocks noGrp="1"/>
+          </p:cNvSpPr>
+          <p:nvPr>
+            <p:ph type="title"/>
+          </p:nvPr>
+        </p:nvSpPr>
+        <p:spPr/>
+        <p:txBody>
+          <a:bodyPr/>
+          <a:lstStyle/>
+          <a:p>
+            <a:r>
+              <a:rPr lang="en-US" dirty="0" smtClean="0"/>
+              <a:t>Wishbone</a:t>
+            </a:r>
+            <a:endParaRPr lang="en-US" dirty="0"/>
+          </a:p>
+        </p:txBody>
+      </p:sp>
+      <p:sp>
+        <p:nvSpPr>
+          <p:cNvPr id="3" name="Content Placeholder 2"/>
+          <p:cNvSpPr>
+            <a:spLocks noGrp="1"/>
+          </p:cNvSpPr>
+          <p:nvPr>
+            <p:ph idx="1"/>
+          </p:nvPr>
+        </p:nvSpPr>
+        <p:spPr>
+          <a:xfrm>
+            <a:off x="457200" y="1524000"/>
+            <a:ext cx="8229600" cy="4779563"/>
+          </a:xfrm>
+        </p:spPr>
+        <p:txBody>
+          <a:bodyPr>
+            <a:normAutofit/>
+          </a:bodyPr>
+          <a:lstStyle/>
+          <a:p>
+            <a:r>
+              <a:rPr lang="en-US" dirty="0" smtClean="0"/>
+              <a:t>Wishbone is an interactive tool to identify bifurcating developmental trajectories from single cell data.</a:t>
+            </a:r>
+          </a:p>
+          <a:p>
+            <a:endParaRPr lang="en-US" dirty="0" smtClean="0"/>
+          </a:p>
+          <a:p>
+            <a:r>
+              <a:rPr lang="en-US" dirty="0" smtClean="0"/>
+              <a:t>It also provides data preprocessing functionality such as dimensionality reduction and gene expression visualization</a:t>
+            </a:r>
+          </a:p>
+          <a:p>
+            <a:pPr marL="0" indent="0">
+              <a:buNone/>
+            </a:pPr>
+            <a:endParaRPr lang="en-US" dirty="0"/>
+          </a:p>
+          <a:p>
+            <a:r>
+              <a:rPr lang="en-US" dirty="0" smtClean="0"/>
+              <a:t>If you use Wishbone, please cite</a:t>
+            </a:r>
+          </a:p>
+          <a:p>
+            <a:pPr marL="0" indent="0">
+              <a:buNone/>
+            </a:pPr>
+            <a:r>
+              <a:rPr lang="en-US" dirty="0" smtClean="0">
+                <a:latin typeface="Corbel"/>
+                <a:cs typeface="Corbel"/>
+              </a:rPr>
+              <a:t>Wishbone </a:t>
+            </a:r>
+            <a:r>
+              <a:rPr lang="en-US" dirty="0">
+                <a:latin typeface="Corbel"/>
+                <a:cs typeface="Corbel"/>
+              </a:rPr>
+              <a:t>identifies bifurcating developmental trajectories from single-cell </a:t>
+            </a:r>
+            <a:r>
+              <a:rPr lang="en-US" dirty="0" smtClean="0">
+                <a:latin typeface="Corbel"/>
+                <a:cs typeface="Corbel"/>
+              </a:rPr>
+              <a:t>data</a:t>
+            </a:r>
+          </a:p>
+          <a:p>
+            <a:pPr marL="0" indent="0">
+              <a:buNone/>
+            </a:pPr>
+            <a:r>
+              <a:rPr lang="en-US" dirty="0" smtClean="0">
+                <a:latin typeface="Corbel"/>
+                <a:cs typeface="Corbel"/>
+              </a:rPr>
+              <a:t>Nature Biotechnology May 2016. DOI: </a:t>
+            </a:r>
+            <a:r>
+              <a:rPr lang="ro-RO" dirty="0">
+                <a:latin typeface="Corbel"/>
+                <a:cs typeface="Corbel"/>
+                <a:hlinkClick r:id="rId2"/>
+              </a:rPr>
+              <a:t>doi:10.1038/nbt.3569</a:t>
+            </a:r>
+            <a:endParaRPr lang="en-US" dirty="0">
+              <a:latin typeface="Corbel"/>
+              <a:cs typeface="Corbel"/>
+            </a:endParaRPr>
+          </a:p>
+        </p:txBody>
+      </p:sp>
+    </p:spTree>
+    <p:extLst>
+      <p:ext uri="{BB962C8B-B14F-4D97-AF65-F5344CB8AC3E}">
+        <p14:creationId xmlns:p14="http://schemas.microsoft.com/office/powerpoint/2010/main" val="2178357613"/>
+      </p:ext>
+    </p:extLst>
+  </p:cSld>
+  <p:clrMapOvr>
+    <a:masterClrMapping/>
+  </p:clrMapOvr>
+  <p:timing>
+    <p:tnLst>
+      <p:par>
+        <p:cTn xmlns:p14="http://schemas.microsoft.com/office/powerpoint/2010/main" id="1" dur="indefinite" restart="never" nodeType="tmRoot"/>
+      </p:par>
+    </p:tnLst>
+  </p:timing>
+</p:sld>
+</file>
+
+<file path=ppt/slides/slide20.xml><?xml version="1.0" encoding="utf-8"?>
 <p:sld xmlns:a="http://schemas.openxmlformats.org/drawingml/2006/main" xmlns:r="http://schemas.openxmlformats.org/officeDocument/2006/relationships" xmlns:p="http://schemas.openxmlformats.org/presentationml/2006/main">
   <p:cSld>
     <p:spTree>
@@ -4659,171 +5078,7 @@
 </p:sld>
 </file>
 
-<file path=ppt/slides/slide2.xml><?xml version="1.0" encoding="utf-8"?>
-<p:sld xmlns:a="http://schemas.openxmlformats.org/drawingml/2006/main" xmlns:r="http://schemas.openxmlformats.org/officeDocument/2006/relationships" xmlns:p="http://schemas.openxmlformats.org/presentationml/2006/main">
-  <p:cSld>
-    <p:spTree>
-      <p:nvGrpSpPr>
-        <p:cNvPr id="1" name=""/>
-        <p:cNvGrpSpPr/>
-        <p:nvPr/>
-      </p:nvGrpSpPr>
-      <p:grpSpPr>
-        <a:xfrm>
-          <a:off x="0" y="0"/>
-          <a:ext cx="0" cy="0"/>
-          <a:chOff x="0" y="0"/>
-          <a:chExt cx="0" cy="0"/>
-        </a:xfrm>
-      </p:grpSpPr>
-      <p:sp>
-        <p:nvSpPr>
-          <p:cNvPr id="2" name="Title 1"/>
-          <p:cNvSpPr>
-            <a:spLocks noGrp="1"/>
-          </p:cNvSpPr>
-          <p:nvPr>
-            <p:ph type="title"/>
-          </p:nvPr>
-        </p:nvSpPr>
-        <p:spPr/>
-        <p:txBody>
-          <a:bodyPr/>
-          <a:lstStyle/>
-          <a:p>
-            <a:r>
-              <a:rPr lang="en-US" dirty="0" smtClean="0"/>
-              <a:t>Wishbone</a:t>
-            </a:r>
-            <a:endParaRPr lang="en-US" dirty="0"/>
-          </a:p>
-        </p:txBody>
-      </p:sp>
-      <p:sp>
-        <p:nvSpPr>
-          <p:cNvPr id="3" name="Content Placeholder 2"/>
-          <p:cNvSpPr>
-            <a:spLocks noGrp="1"/>
-          </p:cNvSpPr>
-          <p:nvPr>
-            <p:ph idx="1"/>
-          </p:nvPr>
-        </p:nvSpPr>
-        <p:spPr>
-          <a:xfrm>
-            <a:off x="457200" y="1524000"/>
-            <a:ext cx="8229600" cy="4779563"/>
-          </a:xfrm>
-        </p:spPr>
-        <p:txBody>
-          <a:bodyPr>
-            <a:normAutofit/>
-          </a:bodyPr>
-          <a:lstStyle/>
-          <a:p>
-            <a:r>
-              <a:rPr lang="en-US" dirty="0" smtClean="0"/>
-              <a:t>Wishbone is an interactive tool to identify bifurcating developmental trajectories from single cell data.</a:t>
-            </a:r>
-          </a:p>
-          <a:p>
-            <a:endParaRPr lang="en-US" dirty="0" smtClean="0"/>
-          </a:p>
-          <a:p>
-            <a:r>
-              <a:rPr lang="en-US" dirty="0" smtClean="0"/>
-              <a:t>It also provides data preprocessing functionality such as dimensionality reduction and gene expression </a:t>
-            </a:r>
-            <a:r>
-              <a:rPr lang="en-US" dirty="0" smtClean="0"/>
-              <a:t>visualization</a:t>
-            </a:r>
-          </a:p>
-          <a:p>
-            <a:pPr marL="0" indent="0">
-              <a:buNone/>
-            </a:pPr>
-            <a:endParaRPr lang="en-US" dirty="0"/>
-          </a:p>
-          <a:p>
-            <a:r>
-              <a:rPr lang="en-US" dirty="0" smtClean="0"/>
-              <a:t>If you use Wishbone, please cite</a:t>
-            </a:r>
-          </a:p>
-          <a:p>
-            <a:pPr marL="0" indent="0">
-              <a:buNone/>
-            </a:pPr>
-            <a:r>
-              <a:rPr lang="en-US" dirty="0" smtClean="0">
-                <a:latin typeface="Corbel"/>
-                <a:cs typeface="Corbel"/>
-              </a:rPr>
-              <a:t>Wishbone </a:t>
-            </a:r>
-            <a:r>
-              <a:rPr lang="en-US" dirty="0">
-                <a:latin typeface="Corbel"/>
-                <a:cs typeface="Corbel"/>
-              </a:rPr>
-              <a:t>identifies bifurcating developmental trajectories from single-cell </a:t>
-            </a:r>
-            <a:r>
-              <a:rPr lang="en-US" dirty="0" smtClean="0">
-                <a:latin typeface="Corbel"/>
-                <a:cs typeface="Corbel"/>
-              </a:rPr>
-              <a:t>data</a:t>
-            </a:r>
-          </a:p>
-          <a:p>
-            <a:pPr marL="0" indent="0">
-              <a:buNone/>
-            </a:pPr>
-            <a:r>
-              <a:rPr lang="en-US" dirty="0" smtClean="0">
-                <a:latin typeface="Corbel"/>
-                <a:cs typeface="Corbel"/>
-              </a:rPr>
-              <a:t>Nature Biotechnology May 2016. DOI: </a:t>
-            </a:r>
-            <a:r>
-              <a:rPr lang="ro-RO" dirty="0">
-                <a:latin typeface="Corbel"/>
-                <a:cs typeface="Corbel"/>
-                <a:hlinkClick r:id="rId2"/>
-              </a:rPr>
-              <a:t>doi:10.1038/nbt.3569</a:t>
-            </a:r>
-            <a:endParaRPr lang="en-US" dirty="0">
-              <a:latin typeface="Corbel"/>
-              <a:cs typeface="Corbel"/>
-            </a:endParaRPr>
-          </a:p>
-        </p:txBody>
-      </p:sp>
-    </p:spTree>
-    <p:extLst>
-      <p:ext uri="{BB962C8B-B14F-4D97-AF65-F5344CB8AC3E}">
-        <p14:creationId xmlns:p14="http://schemas.microsoft.com/office/powerpoint/2010/main" val="2178357613"/>
-      </p:ext>
-    </p:extLst>
-  </p:cSld>
-  <p:clrMapOvr>
-    <a:masterClrMapping/>
-  </p:clrMapOvr>
-  <p:timing>
-    <p:tnLst>
-      <p:par>
-        <p:cTn xmlns:p14="http://schemas.microsoft.com/office/powerpoint/2010/main" id="1" dur="indefinite" restart="never" nodeType="tmRoot"/>
-      </p:par>
-    </p:tnLst>
-  </p:timing>
-</p:sld>
-</file>
-
-<file path=ppt/slides/slide20.xml><?xml version="1.0" encoding="utf-8"?>
+<file path=ppt/slides/slide21.xml><?xml version="1.0" encoding="utf-8"?>
 <p:sld xmlns:a="http://schemas.openxmlformats.org/drawingml/2006/main" xmlns:r="http://schemas.openxmlformats.org/officeDocument/2006/relationships" xmlns:p="http://schemas.openxmlformats.org/presentationml/2006/main">
   <p:cSld>
     <p:spTree>
@@ -6053,12 +6308,6 @@
               </a:rPr>
               <a:t>Use the elbow method to choose the appropriate number of components</a:t>
             </a:r>
-            <a:endParaRPr lang="en-US" dirty="0">
-              <a:solidFill>
-                <a:srgbClr val="292934"/>
-              </a:solidFill>
-              <a:cs typeface="Arial"/>
-            </a:endParaRPr>
           </a:p>
         </p:txBody>
       </p:sp>

</xml_diff>

<commit_message>
added tSNE perplexity to ppt tutorial
</commit_message>
<xml_diff>
--- a/docs/wishbone_tutorial.pptx
+++ b/docs/wishbone_tutorial.pptx
@@ -321,7 +321,7 @@
           <a:p>
             <a:fld id="{249D404F-B59E-3249-9345-AAE4E529CC32}" type="datetimeFigureOut">
               <a:rPr lang="en-US" smtClean="0"/>
-              <a:t>6/23/16</a:t>
+              <a:t>7/6/16</a:t>
             </a:fld>
             <a:endParaRPr lang="en-US"/>
           </a:p>
@@ -522,7 +522,7 @@
           <a:p>
             <a:fld id="{249D404F-B59E-3249-9345-AAE4E529CC32}" type="datetimeFigureOut">
               <a:rPr lang="en-US" smtClean="0"/>
-              <a:t>6/23/16</a:t>
+              <a:t>7/6/16</a:t>
             </a:fld>
             <a:endParaRPr lang="en-US"/>
           </a:p>
@@ -697,7 +697,7 @@
           <a:p>
             <a:fld id="{249D404F-B59E-3249-9345-AAE4E529CC32}" type="datetimeFigureOut">
               <a:rPr lang="en-US" smtClean="0"/>
-              <a:t>6/23/16</a:t>
+              <a:t>7/6/16</a:t>
             </a:fld>
             <a:endParaRPr lang="en-US"/>
           </a:p>
@@ -862,7 +862,7 @@
           <a:p>
             <a:fld id="{249D404F-B59E-3249-9345-AAE4E529CC32}" type="datetimeFigureOut">
               <a:rPr lang="en-US" smtClean="0"/>
-              <a:t>6/23/16</a:t>
+              <a:t>7/6/16</a:t>
             </a:fld>
             <a:endParaRPr lang="en-US"/>
           </a:p>
@@ -1110,7 +1110,7 @@
           <a:p>
             <a:fld id="{249D404F-B59E-3249-9345-AAE4E529CC32}" type="datetimeFigureOut">
               <a:rPr lang="en-US" smtClean="0"/>
-              <a:t>6/23/16</a:t>
+              <a:t>7/6/16</a:t>
             </a:fld>
             <a:endParaRPr lang="en-US"/>
           </a:p>
@@ -1428,7 +1428,7 @@
           <a:p>
             <a:fld id="{249D404F-B59E-3249-9345-AAE4E529CC32}" type="datetimeFigureOut">
               <a:rPr lang="en-US" smtClean="0"/>
-              <a:t>6/23/16</a:t>
+              <a:t>7/6/16</a:t>
             </a:fld>
             <a:endParaRPr lang="en-US"/>
           </a:p>
@@ -1894,7 +1894,7 @@
           <a:p>
             <a:fld id="{249D404F-B59E-3249-9345-AAE4E529CC32}" type="datetimeFigureOut">
               <a:rPr lang="en-US" smtClean="0"/>
-              <a:t>6/23/16</a:t>
+              <a:t>7/6/16</a:t>
             </a:fld>
             <a:endParaRPr lang="en-US"/>
           </a:p>
@@ -2042,7 +2042,7 @@
           <a:p>
             <a:fld id="{249D404F-B59E-3249-9345-AAE4E529CC32}" type="datetimeFigureOut">
               <a:rPr lang="en-US" smtClean="0"/>
-              <a:t>6/23/16</a:t>
+              <a:t>7/6/16</a:t>
             </a:fld>
             <a:endParaRPr lang="en-US"/>
           </a:p>
@@ -2132,7 +2132,7 @@
           <a:p>
             <a:fld id="{249D404F-B59E-3249-9345-AAE4E529CC32}" type="datetimeFigureOut">
               <a:rPr lang="en-US" smtClean="0"/>
-              <a:t>6/23/16</a:t>
+              <a:t>7/6/16</a:t>
             </a:fld>
             <a:endParaRPr lang="en-US"/>
           </a:p>
@@ -2406,7 +2406,7 @@
           <a:p>
             <a:fld id="{249D404F-B59E-3249-9345-AAE4E529CC32}" type="datetimeFigureOut">
               <a:rPr lang="en-US" smtClean="0"/>
-              <a:t>6/23/16</a:t>
+              <a:t>7/6/16</a:t>
             </a:fld>
             <a:endParaRPr lang="en-US"/>
           </a:p>
@@ -2712,7 +2712,7 @@
           <a:p>
             <a:fld id="{249D404F-B59E-3249-9345-AAE4E529CC32}" type="datetimeFigureOut">
               <a:rPr lang="en-US" smtClean="0"/>
-              <a:t>6/23/16</a:t>
+              <a:t>7/6/16</a:t>
             </a:fld>
             <a:endParaRPr lang="en-US"/>
           </a:p>
@@ -3010,7 +3010,7 @@
           <a:p>
             <a:fld id="{249D404F-B59E-3249-9345-AAE4E529CC32}" type="datetimeFigureOut">
               <a:rPr lang="en-US" smtClean="0"/>
-              <a:t>6/23/16</a:t>
+              <a:t>7/6/16</a:t>
             </a:fld>
             <a:endParaRPr lang="en-US"/>
           </a:p>
@@ -4485,11 +4485,7 @@
           <a:p>
             <a:r>
               <a:rPr lang="en-US" dirty="0" smtClean="0"/>
-              <a:t>You will be prompted to enter a start cell, a k value for the construction of a k-nearest neighbors graph, which diffusion components to use,  the number of waypoints to use, and whether to compute branches in the trajectory</a:t>
-            </a:r>
-            <a:r>
-              <a:rPr lang="en-US" dirty="0" smtClean="0"/>
-              <a:t>.</a:t>
+              <a:t>You will be prompted to enter a start cell, a k value for the construction of a k-nearest neighbors graph, which diffusion components to use,  the number of waypoints to use, and whether to compute branches in the trajectory.</a:t>
             </a:r>
           </a:p>
           <a:p>
@@ -6290,15 +6286,17 @@
                 </a:solidFill>
                 <a:cs typeface="Arial"/>
               </a:rPr>
-              <a:t>You will be prompted to enter the number of components to use for tSNE. </a:t>
-            </a:r>
-          </a:p>
-          <a:p>
-            <a:pPr lvl="1">
-              <a:buClr>
-                <a:srgbClr val="93A299"/>
-              </a:buClr>
-            </a:pPr>
+              <a:t>You will be prompted to enter the number of </a:t>
+            </a:r>
+            <a:r>
+              <a:rPr lang="en-US" dirty="0" smtClean="0">
+                <a:solidFill>
+                  <a:srgbClr val="292934"/>
+                </a:solidFill>
+                <a:cs typeface="Arial"/>
+              </a:rPr>
+              <a:t>components and perplexity </a:t>
+            </a:r>
             <a:r>
               <a:rPr lang="en-US" dirty="0">
                 <a:solidFill>
@@ -6306,14 +6304,61 @@
                 </a:solidFill>
                 <a:cs typeface="Arial"/>
               </a:rPr>
-              <a:t>Use the elbow method to choose the appropriate number of components</a:t>
-            </a:r>
+              <a:t>to use for tSNE. </a:t>
+            </a:r>
+          </a:p>
+          <a:p>
+            <a:pPr lvl="1">
+              <a:buClr>
+                <a:srgbClr val="93A299"/>
+              </a:buClr>
+            </a:pPr>
+            <a:r>
+              <a:rPr lang="en-US" dirty="0">
+                <a:solidFill>
+                  <a:srgbClr val="292934"/>
+                </a:solidFill>
+                <a:cs typeface="Arial"/>
+              </a:rPr>
+              <a:t>Use the elbow method to choose the appropriate number of </a:t>
+            </a:r>
+            <a:r>
+              <a:rPr lang="en-US" dirty="0" smtClean="0">
+                <a:solidFill>
+                  <a:srgbClr val="292934"/>
+                </a:solidFill>
+                <a:cs typeface="Arial"/>
+              </a:rPr>
+              <a:t>components</a:t>
+            </a:r>
+          </a:p>
+          <a:p>
+            <a:pPr lvl="1">
+              <a:buClr>
+                <a:srgbClr val="93A299"/>
+              </a:buClr>
+            </a:pPr>
+            <a:r>
+              <a:rPr lang="en-US" dirty="0" smtClean="0">
+                <a:solidFill>
+                  <a:srgbClr val="292934"/>
+                </a:solidFill>
+                <a:cs typeface="Arial"/>
+              </a:rPr>
+              <a:t>If the cell count is less than 100, the perplexity should be reduced</a:t>
+            </a:r>
+            <a:endParaRPr lang="en-US" dirty="0">
+              <a:solidFill>
+                <a:srgbClr val="292934"/>
+              </a:solidFill>
+              <a:cs typeface="Arial"/>
+            </a:endParaRPr>
           </a:p>
         </p:txBody>
       </p:sp>
       <p:pic>
         <p:nvPicPr>
-          <p:cNvPr id="5" name="Picture 4" descr="Screen Shot 2016-04-26 at 5.20.50 PM.png"/>
+          <p:cNvPr id="4" name="Picture 3" descr="Screen Shot 2016-07-06 at 11.39.50 AM.png"/>
           <p:cNvPicPr>
             <a:picLocks noChangeAspect="1"/>
           </p:cNvPicPr>
@@ -6333,8 +6378,8 @@
         </p:blipFill>
         <p:spPr>
           <a:xfrm>
-            <a:off x="4321736" y="5155997"/>
-            <a:ext cx="4365064" cy="970014"/>
+            <a:off x="4145339" y="4952795"/>
+            <a:ext cx="4812028" cy="1719708"/>
           </a:xfrm>
           <a:prstGeom prst="rect">
             <a:avLst/>

</xml_diff>

<commit_message>
added mass cytometry usage to ppt tutorial
</commit_message>
<xml_diff>
--- a/docs/wishbone_tutorial.pptx
+++ b/docs/wishbone_tutorial.pptx
@@ -321,7 +321,7 @@
           <a:p>
             <a:fld id="{249D404F-B59E-3249-9345-AAE4E529CC32}" type="datetimeFigureOut">
               <a:rPr lang="en-US" smtClean="0"/>
-              <a:t>7/6/16</a:t>
+              <a:t>7/19/16</a:t>
             </a:fld>
             <a:endParaRPr lang="en-US"/>
           </a:p>
@@ -522,7 +522,7 @@
           <a:p>
             <a:fld id="{249D404F-B59E-3249-9345-AAE4E529CC32}" type="datetimeFigureOut">
               <a:rPr lang="en-US" smtClean="0"/>
-              <a:t>7/6/16</a:t>
+              <a:t>7/19/16</a:t>
             </a:fld>
             <a:endParaRPr lang="en-US"/>
           </a:p>
@@ -697,7 +697,7 @@
           <a:p>
             <a:fld id="{249D404F-B59E-3249-9345-AAE4E529CC32}" type="datetimeFigureOut">
               <a:rPr lang="en-US" smtClean="0"/>
-              <a:t>7/6/16</a:t>
+              <a:t>7/19/16</a:t>
             </a:fld>
             <a:endParaRPr lang="en-US"/>
           </a:p>
@@ -862,7 +862,7 @@
           <a:p>
             <a:fld id="{249D404F-B59E-3249-9345-AAE4E529CC32}" type="datetimeFigureOut">
               <a:rPr lang="en-US" smtClean="0"/>
-              <a:t>7/6/16</a:t>
+              <a:t>7/19/16</a:t>
             </a:fld>
             <a:endParaRPr lang="en-US"/>
           </a:p>
@@ -1110,7 +1110,7 @@
           <a:p>
             <a:fld id="{249D404F-B59E-3249-9345-AAE4E529CC32}" type="datetimeFigureOut">
               <a:rPr lang="en-US" smtClean="0"/>
-              <a:t>7/6/16</a:t>
+              <a:t>7/19/16</a:t>
             </a:fld>
             <a:endParaRPr lang="en-US"/>
           </a:p>
@@ -1428,7 +1428,7 @@
           <a:p>
             <a:fld id="{249D404F-B59E-3249-9345-AAE4E529CC32}" type="datetimeFigureOut">
               <a:rPr lang="en-US" smtClean="0"/>
-              <a:t>7/6/16</a:t>
+              <a:t>7/19/16</a:t>
             </a:fld>
             <a:endParaRPr lang="en-US"/>
           </a:p>
@@ -1894,7 +1894,7 @@
           <a:p>
             <a:fld id="{249D404F-B59E-3249-9345-AAE4E529CC32}" type="datetimeFigureOut">
               <a:rPr lang="en-US" smtClean="0"/>
-              <a:t>7/6/16</a:t>
+              <a:t>7/19/16</a:t>
             </a:fld>
             <a:endParaRPr lang="en-US"/>
           </a:p>
@@ -2042,7 +2042,7 @@
           <a:p>
             <a:fld id="{249D404F-B59E-3249-9345-AAE4E529CC32}" type="datetimeFigureOut">
               <a:rPr lang="en-US" smtClean="0"/>
-              <a:t>7/6/16</a:t>
+              <a:t>7/19/16</a:t>
             </a:fld>
             <a:endParaRPr lang="en-US"/>
           </a:p>
@@ -2132,7 +2132,7 @@
           <a:p>
             <a:fld id="{249D404F-B59E-3249-9345-AAE4E529CC32}" type="datetimeFigureOut">
               <a:rPr lang="en-US" smtClean="0"/>
-              <a:t>7/6/16</a:t>
+              <a:t>7/19/16</a:t>
             </a:fld>
             <a:endParaRPr lang="en-US"/>
           </a:p>
@@ -2406,7 +2406,7 @@
           <a:p>
             <a:fld id="{249D404F-B59E-3249-9345-AAE4E529CC32}" type="datetimeFigureOut">
               <a:rPr lang="en-US" smtClean="0"/>
-              <a:t>7/6/16</a:t>
+              <a:t>7/19/16</a:t>
             </a:fld>
             <a:endParaRPr lang="en-US"/>
           </a:p>
@@ -2712,7 +2712,7 @@
           <a:p>
             <a:fld id="{249D404F-B59E-3249-9345-AAE4E529CC32}" type="datetimeFigureOut">
               <a:rPr lang="en-US" smtClean="0"/>
-              <a:t>7/6/16</a:t>
+              <a:t>7/19/16</a:t>
             </a:fld>
             <a:endParaRPr lang="en-US"/>
           </a:p>
@@ -3010,7 +3010,7 @@
           <a:p>
             <a:fld id="{249D404F-B59E-3249-9345-AAE4E529CC32}" type="datetimeFigureOut">
               <a:rPr lang="en-US" smtClean="0"/>
-              <a:t>7/6/16</a:t>
+              <a:t>7/19/16</a:t>
             </a:fld>
             <a:endParaRPr lang="en-US"/>
           </a:p>
@@ -5693,7 +5693,7 @@
         <p:spPr>
           <a:xfrm>
             <a:off x="457200" y="1600201"/>
-            <a:ext cx="8229600" cy="2051520"/>
+            <a:ext cx="8229600" cy="2569132"/>
           </a:xfrm>
           <a:prstGeom prst="rect">
             <a:avLst/>
@@ -5701,7 +5701,7 @@
         </p:spPr>
         <p:txBody>
           <a:bodyPr vert="horz" lIns="91440" tIns="45720" rIns="91440" bIns="45720" rtlCol="0">
-            <a:normAutofit/>
+            <a:noAutofit/>
           </a:bodyPr>
           <a:lstStyle>
             <a:lvl1pPr marL="342900" indent="-342900" algn="l" defTabSz="457200" rtl="0" eaLnBrk="1" latinLnBrk="0" hangingPunct="1">
@@ -5842,10 +5842,80 @@
           </a:lstStyle>
           <a:p>
             <a:r>
-              <a:rPr lang="en-US" sz="2400" dirty="0" smtClean="0"/>
-              <a:t>After selecting a file, you will be prompted to enter a name for the data and choose whether or not to correct for library size among cells.</a:t>
-            </a:r>
-            <a:endParaRPr lang="en-US" sz="2400" dirty="0"/>
+              <a:rPr lang="en-US" sz="2400" dirty="0" smtClean="0">
+                <a:latin typeface="Corbel"/>
+                <a:cs typeface="Corbel"/>
+              </a:rPr>
+              <a:t>After selecting a file, you will be prompted to enter a name for the data </a:t>
+            </a:r>
+            <a:endParaRPr lang="en-US" sz="2400" dirty="0">
+              <a:latin typeface="Corbel"/>
+              <a:cs typeface="Corbel"/>
+            </a:endParaRPr>
+          </a:p>
+          <a:p>
+            <a:r>
+              <a:rPr lang="en-US" sz="2400" dirty="0" smtClean="0">
+                <a:latin typeface="Corbel"/>
+                <a:cs typeface="Corbel"/>
+              </a:rPr>
+              <a:t>If you’ve selected </a:t>
+            </a:r>
+            <a:r>
+              <a:rPr lang="en-US" sz="2400" dirty="0" err="1" smtClean="0">
+                <a:latin typeface="Corbel"/>
+                <a:cs typeface="Corbel"/>
+              </a:rPr>
+              <a:t>sc-seq</a:t>
+            </a:r>
+            <a:r>
+              <a:rPr lang="en-US" sz="2400" dirty="0" smtClean="0">
+                <a:latin typeface="Corbel"/>
+                <a:cs typeface="Corbel"/>
+              </a:rPr>
+              <a:t> data, you will also be asked to choose </a:t>
+            </a:r>
+            <a:r>
+              <a:rPr lang="en-US" sz="2400" dirty="0" smtClean="0">
+                <a:latin typeface="Corbel"/>
+                <a:cs typeface="Corbel"/>
+              </a:rPr>
+              <a:t>whether or not to correct for library size among cells</a:t>
+            </a:r>
+            <a:r>
+              <a:rPr lang="en-US" sz="2400" dirty="0" smtClean="0">
+                <a:latin typeface="Corbel"/>
+                <a:cs typeface="Corbel"/>
+              </a:rPr>
+              <a:t>.</a:t>
+            </a:r>
+          </a:p>
+          <a:p>
+            <a:r>
+              <a:rPr lang="en-US" sz="2400" dirty="0" smtClean="0">
+                <a:latin typeface="Corbel"/>
+                <a:cs typeface="Corbel"/>
+              </a:rPr>
+              <a:t>If you’ve selected mass </a:t>
+            </a:r>
+            <a:r>
+              <a:rPr lang="en-US" sz="2400" dirty="0" err="1" smtClean="0">
+                <a:latin typeface="Corbel"/>
+                <a:cs typeface="Corbel"/>
+              </a:rPr>
+              <a:t>cytometry</a:t>
+            </a:r>
+            <a:r>
+              <a:rPr lang="en-US" sz="2400" dirty="0" smtClean="0">
+                <a:latin typeface="Corbel"/>
+                <a:cs typeface="Corbel"/>
+              </a:rPr>
+              <a:t> data, you will be prompted to enter a cofactor for normalization</a:t>
+            </a:r>
+            <a:endParaRPr lang="en-US" sz="2400" dirty="0">
+              <a:latin typeface="Corbel"/>
+              <a:cs typeface="Corbel"/>
+            </a:endParaRPr>
           </a:p>
         </p:txBody>
       </p:sp>
@@ -5871,14 +5941,431 @@
         </p:blipFill>
         <p:spPr>
           <a:xfrm>
-            <a:off x="457200" y="3845314"/>
-            <a:ext cx="8229600" cy="2511036"/>
+            <a:off x="374373" y="4741622"/>
+            <a:ext cx="5092357" cy="1553793"/>
           </a:xfrm>
           <a:prstGeom prst="rect">
             <a:avLst/>
           </a:prstGeom>
         </p:spPr>
       </p:pic>
+      <p:pic>
+        <p:nvPicPr>
+          <p:cNvPr id="3" name="Picture 2" descr="Screen Shot 2016-07-19 at 5.07.44 PM.png"/>
+          <p:cNvPicPr>
+            <a:picLocks noChangeAspect="1"/>
+          </p:cNvPicPr>
+          <p:nvPr/>
+        </p:nvPicPr>
+        <p:blipFill>
+          <a:blip r:embed="rId3">
+            <a:extLst>
+              <a:ext uri="{28A0092B-C50C-407E-A947-70E740481C1C}">
+                <a14:useLocalDpi xmlns:a14="http://schemas.microsoft.com/office/drawing/2010/main" val="0"/>
+              </a:ext>
+            </a:extLst>
+          </a:blip>
+          <a:stretch>
+            <a:fillRect/>
+          </a:stretch>
+        </p:blipFill>
+        <p:spPr>
+          <a:xfrm>
+            <a:off x="5890706" y="4741622"/>
+            <a:ext cx="2665353" cy="1553793"/>
+          </a:xfrm>
+          <a:prstGeom prst="rect">
+            <a:avLst/>
+          </a:prstGeom>
+        </p:spPr>
+      </p:pic>
+      <p:sp>
+        <p:nvSpPr>
+          <p:cNvPr id="6" name="Content Placeholder 2"/>
+          <p:cNvSpPr txBox="1">
+            <a:spLocks/>
+          </p:cNvSpPr>
+          <p:nvPr/>
+        </p:nvSpPr>
+        <p:spPr>
+          <a:xfrm>
+            <a:off x="319154" y="4275274"/>
+            <a:ext cx="1420259" cy="450791"/>
+          </a:xfrm>
+          <a:prstGeom prst="rect">
+            <a:avLst/>
+          </a:prstGeom>
+        </p:spPr>
+        <p:txBody>
+          <a:bodyPr vert="horz" lIns="91440" tIns="45720" rIns="91440" bIns="45720" rtlCol="0">
+            <a:noAutofit/>
+          </a:bodyPr>
+          <a:lstStyle>
+            <a:lvl1pPr marL="342900" indent="-342900" algn="l" defTabSz="457200" rtl="0" eaLnBrk="1" latinLnBrk="0" hangingPunct="1">
+              <a:spcBef>
+                <a:spcPct val="20000"/>
+              </a:spcBef>
+              <a:buFont typeface="Arial"/>
+              <a:buChar char="•"/>
+              <a:defRPr sz="3200" kern="1200">
+                <a:solidFill>
+                  <a:schemeClr val="tx1"/>
+                </a:solidFill>
+                <a:latin typeface="+mn-lt"/>
+                <a:ea typeface="+mn-ea"/>
+                <a:cs typeface="+mn-cs"/>
+              </a:defRPr>
+            </a:lvl1pPr>
+            <a:lvl2pPr marL="742950" indent="-285750" algn="l" defTabSz="457200" rtl="0" eaLnBrk="1" latinLnBrk="0" hangingPunct="1">
+              <a:spcBef>
+                <a:spcPct val="20000"/>
+              </a:spcBef>
+              <a:buFont typeface="Arial"/>
+              <a:buChar char="–"/>
+              <a:defRPr sz="2800" kern="1200">
+                <a:solidFill>
+                  <a:schemeClr val="tx1"/>
+                </a:solidFill>
+                <a:latin typeface="+mn-lt"/>
+                <a:ea typeface="+mn-ea"/>
+                <a:cs typeface="+mn-cs"/>
+              </a:defRPr>
+            </a:lvl2pPr>
+            <a:lvl3pPr marL="1143000" indent="-228600" algn="l" defTabSz="457200" rtl="0" eaLnBrk="1" latinLnBrk="0" hangingPunct="1">
+              <a:spcBef>
+                <a:spcPct val="20000"/>
+              </a:spcBef>
+              <a:buFont typeface="Arial"/>
+              <a:buChar char="•"/>
+              <a:defRPr sz="2400" kern="1200">
+                <a:solidFill>
+                  <a:schemeClr val="tx1"/>
+                </a:solidFill>
+                <a:latin typeface="+mn-lt"/>
+                <a:ea typeface="+mn-ea"/>
+                <a:cs typeface="+mn-cs"/>
+              </a:defRPr>
+            </a:lvl3pPr>
+            <a:lvl4pPr marL="1600200" indent="-228600" algn="l" defTabSz="457200" rtl="0" eaLnBrk="1" latinLnBrk="0" hangingPunct="1">
+              <a:spcBef>
+                <a:spcPct val="20000"/>
+              </a:spcBef>
+              <a:buFont typeface="Arial"/>
+              <a:buChar char="–"/>
+              <a:defRPr sz="2000" kern="1200">
+                <a:solidFill>
+                  <a:schemeClr val="tx1"/>
+                </a:solidFill>
+                <a:latin typeface="+mn-lt"/>
+                <a:ea typeface="+mn-ea"/>
+                <a:cs typeface="+mn-cs"/>
+              </a:defRPr>
+            </a:lvl4pPr>
+            <a:lvl5pPr marL="2057400" indent="-228600" algn="l" defTabSz="457200" rtl="0" eaLnBrk="1" latinLnBrk="0" hangingPunct="1">
+              <a:spcBef>
+                <a:spcPct val="20000"/>
+              </a:spcBef>
+              <a:buFont typeface="Arial"/>
+              <a:buChar char="»"/>
+              <a:defRPr sz="2000" kern="1200">
+                <a:solidFill>
+                  <a:schemeClr val="tx1"/>
+                </a:solidFill>
+                <a:latin typeface="+mn-lt"/>
+                <a:ea typeface="+mn-ea"/>
+                <a:cs typeface="+mn-cs"/>
+              </a:defRPr>
+            </a:lvl5pPr>
+            <a:lvl6pPr marL="2514600" indent="-228600" algn="l" defTabSz="457200" rtl="0" eaLnBrk="1" latinLnBrk="0" hangingPunct="1">
+              <a:spcBef>
+                <a:spcPct val="20000"/>
+              </a:spcBef>
+              <a:buFont typeface="Arial"/>
+              <a:buChar char="•"/>
+              <a:defRPr sz="2000" kern="1200">
+                <a:solidFill>
+                  <a:schemeClr val="tx1"/>
+                </a:solidFill>
+                <a:latin typeface="+mn-lt"/>
+                <a:ea typeface="+mn-ea"/>
+                <a:cs typeface="+mn-cs"/>
+              </a:defRPr>
+            </a:lvl6pPr>
+            <a:lvl7pPr marL="2971800" indent="-228600" algn="l" defTabSz="457200" rtl="0" eaLnBrk="1" latinLnBrk="0" hangingPunct="1">
+              <a:spcBef>
+                <a:spcPct val="20000"/>
+              </a:spcBef>
+              <a:buFont typeface="Arial"/>
+              <a:buChar char="•"/>
+              <a:defRPr sz="2000" kern="1200">
+                <a:solidFill>
+                  <a:schemeClr val="tx1"/>
+                </a:solidFill>
+                <a:latin typeface="+mn-lt"/>
+                <a:ea typeface="+mn-ea"/>
+                <a:cs typeface="+mn-cs"/>
+              </a:defRPr>
+            </a:lvl7pPr>
+            <a:lvl8pPr marL="3429000" indent="-228600" algn="l" defTabSz="457200" rtl="0" eaLnBrk="1" latinLnBrk="0" hangingPunct="1">
+              <a:spcBef>
+                <a:spcPct val="20000"/>
+              </a:spcBef>
+              <a:buFont typeface="Arial"/>
+              <a:buChar char="•"/>
+              <a:defRPr sz="2000" kern="1200">
+                <a:solidFill>
+                  <a:schemeClr val="tx1"/>
+                </a:solidFill>
+                <a:latin typeface="+mn-lt"/>
+                <a:ea typeface="+mn-ea"/>
+                <a:cs typeface="+mn-cs"/>
+              </a:defRPr>
+            </a:lvl8pPr>
+            <a:lvl9pPr marL="3886200" indent="-228600" algn="l" defTabSz="457200" rtl="0" eaLnBrk="1" latinLnBrk="0" hangingPunct="1">
+              <a:spcBef>
+                <a:spcPct val="20000"/>
+              </a:spcBef>
+              <a:buFont typeface="Arial"/>
+              <a:buChar char="•"/>
+              <a:defRPr sz="2000" kern="1200">
+                <a:solidFill>
+                  <a:schemeClr val="tx1"/>
+                </a:solidFill>
+                <a:latin typeface="+mn-lt"/>
+                <a:ea typeface="+mn-ea"/>
+                <a:cs typeface="+mn-cs"/>
+              </a:defRPr>
+            </a:lvl9pPr>
+          </a:lstStyle>
+          <a:p>
+            <a:pPr marL="0" indent="0">
+              <a:buNone/>
+            </a:pPr>
+            <a:r>
+              <a:rPr lang="en-US" sz="1800" b="1" dirty="0" err="1">
+                <a:latin typeface="Corbel"/>
+                <a:cs typeface="Corbel"/>
+              </a:rPr>
+              <a:t>s</a:t>
+            </a:r>
+            <a:r>
+              <a:rPr lang="en-US" sz="1800" b="1" dirty="0" err="1" smtClean="0">
+                <a:latin typeface="Corbel"/>
+                <a:cs typeface="Corbel"/>
+              </a:rPr>
+              <a:t>c-seq</a:t>
+            </a:r>
+            <a:r>
+              <a:rPr lang="en-US" sz="1800" b="1" dirty="0" smtClean="0">
+                <a:latin typeface="Corbel"/>
+                <a:cs typeface="Corbel"/>
+              </a:rPr>
+              <a:t> data</a:t>
+            </a:r>
+            <a:endParaRPr lang="en-US" sz="1800" b="1" dirty="0">
+              <a:latin typeface="Corbel"/>
+              <a:cs typeface="Corbel"/>
+            </a:endParaRPr>
+          </a:p>
+        </p:txBody>
+      </p:sp>
+      <p:sp>
+        <p:nvSpPr>
+          <p:cNvPr id="8" name="Content Placeholder 2"/>
+          <p:cNvSpPr txBox="1">
+            <a:spLocks/>
+          </p:cNvSpPr>
+          <p:nvPr/>
+        </p:nvSpPr>
+        <p:spPr>
+          <a:xfrm>
+            <a:off x="5835486" y="4275274"/>
+            <a:ext cx="2651548" cy="450791"/>
+          </a:xfrm>
+          <a:prstGeom prst="rect">
+            <a:avLst/>
+          </a:prstGeom>
+        </p:spPr>
+        <p:txBody>
+          <a:bodyPr vert="horz" lIns="91440" tIns="45720" rIns="91440" bIns="45720" rtlCol="0">
+            <a:noAutofit/>
+          </a:bodyPr>
+          <a:lstStyle>
+            <a:lvl1pPr marL="342900" indent="-342900" algn="l" defTabSz="457200" rtl="0" eaLnBrk="1" latinLnBrk="0" hangingPunct="1">
+              <a:spcBef>
+                <a:spcPct val="20000"/>
+              </a:spcBef>
+              <a:buFont typeface="Arial"/>
+              <a:buChar char="•"/>
+              <a:defRPr sz="3200" kern="1200">
+                <a:solidFill>
+                  <a:schemeClr val="tx1"/>
+                </a:solidFill>
+                <a:latin typeface="+mn-lt"/>
+                <a:ea typeface="+mn-ea"/>
+                <a:cs typeface="+mn-cs"/>
+              </a:defRPr>
+            </a:lvl1pPr>
+            <a:lvl2pPr marL="742950" indent="-285750" algn="l" defTabSz="457200" rtl="0" eaLnBrk="1" latinLnBrk="0" hangingPunct="1">
+              <a:spcBef>
+                <a:spcPct val="20000"/>
+              </a:spcBef>
+              <a:buFont typeface="Arial"/>
+              <a:buChar char="–"/>
+              <a:defRPr sz="2800" kern="1200">
+                <a:solidFill>
+                  <a:schemeClr val="tx1"/>
+                </a:solidFill>
+                <a:latin typeface="+mn-lt"/>
+                <a:ea typeface="+mn-ea"/>
+                <a:cs typeface="+mn-cs"/>
+              </a:defRPr>
+            </a:lvl2pPr>
+            <a:lvl3pPr marL="1143000" indent="-228600" algn="l" defTabSz="457200" rtl="0" eaLnBrk="1" latinLnBrk="0" hangingPunct="1">
+              <a:spcBef>
+                <a:spcPct val="20000"/>
+              </a:spcBef>
+              <a:buFont typeface="Arial"/>
+              <a:buChar char="•"/>
+              <a:defRPr sz="2400" kern="1200">
+                <a:solidFill>
+                  <a:schemeClr val="tx1"/>
+                </a:solidFill>
+                <a:latin typeface="+mn-lt"/>
+                <a:ea typeface="+mn-ea"/>
+                <a:cs typeface="+mn-cs"/>
+              </a:defRPr>
+            </a:lvl3pPr>
+            <a:lvl4pPr marL="1600200" indent="-228600" algn="l" defTabSz="457200" rtl="0" eaLnBrk="1" latinLnBrk="0" hangingPunct="1">
+              <a:spcBef>
+                <a:spcPct val="20000"/>
+              </a:spcBef>
+              <a:buFont typeface="Arial"/>
+              <a:buChar char="–"/>
+              <a:defRPr sz="2000" kern="1200">
+                <a:solidFill>
+                  <a:schemeClr val="tx1"/>
+                </a:solidFill>
+                <a:latin typeface="+mn-lt"/>
+                <a:ea typeface="+mn-ea"/>
+                <a:cs typeface="+mn-cs"/>
+              </a:defRPr>
+            </a:lvl4pPr>
+            <a:lvl5pPr marL="2057400" indent="-228600" algn="l" defTabSz="457200" rtl="0" eaLnBrk="1" latinLnBrk="0" hangingPunct="1">
+              <a:spcBef>
+                <a:spcPct val="20000"/>
+              </a:spcBef>
+              <a:buFont typeface="Arial"/>
+              <a:buChar char="»"/>
+              <a:defRPr sz="2000" kern="1200">
+                <a:solidFill>
+                  <a:schemeClr val="tx1"/>
+                </a:solidFill>
+                <a:latin typeface="+mn-lt"/>
+                <a:ea typeface="+mn-ea"/>
+                <a:cs typeface="+mn-cs"/>
+              </a:defRPr>
+            </a:lvl5pPr>
+            <a:lvl6pPr marL="2514600" indent="-228600" algn="l" defTabSz="457200" rtl="0" eaLnBrk="1" latinLnBrk="0" hangingPunct="1">
+              <a:spcBef>
+                <a:spcPct val="20000"/>
+              </a:spcBef>
+              <a:buFont typeface="Arial"/>
+              <a:buChar char="•"/>
+              <a:defRPr sz="2000" kern="1200">
+                <a:solidFill>
+                  <a:schemeClr val="tx1"/>
+                </a:solidFill>
+                <a:latin typeface="+mn-lt"/>
+                <a:ea typeface="+mn-ea"/>
+                <a:cs typeface="+mn-cs"/>
+              </a:defRPr>
+            </a:lvl6pPr>
+            <a:lvl7pPr marL="2971800" indent="-228600" algn="l" defTabSz="457200" rtl="0" eaLnBrk="1" latinLnBrk="0" hangingPunct="1">
+              <a:spcBef>
+                <a:spcPct val="20000"/>
+              </a:spcBef>
+              <a:buFont typeface="Arial"/>
+              <a:buChar char="•"/>
+              <a:defRPr sz="2000" kern="1200">
+                <a:solidFill>
+                  <a:schemeClr val="tx1"/>
+                </a:solidFill>
+                <a:latin typeface="+mn-lt"/>
+                <a:ea typeface="+mn-ea"/>
+                <a:cs typeface="+mn-cs"/>
+              </a:defRPr>
+            </a:lvl7pPr>
+            <a:lvl8pPr marL="3429000" indent="-228600" algn="l" defTabSz="457200" rtl="0" eaLnBrk="1" latinLnBrk="0" hangingPunct="1">
+              <a:spcBef>
+                <a:spcPct val="20000"/>
+              </a:spcBef>
+              <a:buFont typeface="Arial"/>
+              <a:buChar char="•"/>
+              <a:defRPr sz="2000" kern="1200">
+                <a:solidFill>
+                  <a:schemeClr val="tx1"/>
+                </a:solidFill>
+                <a:latin typeface="+mn-lt"/>
+                <a:ea typeface="+mn-ea"/>
+                <a:cs typeface="+mn-cs"/>
+              </a:defRPr>
+            </a:lvl8pPr>
+            <a:lvl9pPr marL="3886200" indent="-228600" algn="l" defTabSz="457200" rtl="0" eaLnBrk="1" latinLnBrk="0" hangingPunct="1">
+              <a:spcBef>
+                <a:spcPct val="20000"/>
+              </a:spcBef>
+              <a:buFont typeface="Arial"/>
+              <a:buChar char="•"/>
+              <a:defRPr sz="2000" kern="1200">
+                <a:solidFill>
+                  <a:schemeClr val="tx1"/>
+                </a:solidFill>
+                <a:latin typeface="+mn-lt"/>
+                <a:ea typeface="+mn-ea"/>
+                <a:cs typeface="+mn-cs"/>
+              </a:defRPr>
+            </a:lvl9pPr>
+          </a:lstStyle>
+          <a:p>
+            <a:pPr marL="0" indent="0">
+              <a:buNone/>
+            </a:pPr>
+            <a:r>
+              <a:rPr lang="en-US" sz="1800" b="1" dirty="0">
+                <a:latin typeface="Corbel"/>
+                <a:cs typeface="Corbel"/>
+              </a:rPr>
+              <a:t>m</a:t>
+            </a:r>
+            <a:r>
+              <a:rPr lang="en-US" sz="1800" b="1" dirty="0" smtClean="0">
+                <a:latin typeface="Corbel"/>
+                <a:cs typeface="Corbel"/>
+              </a:rPr>
+              <a:t>ass </a:t>
+            </a:r>
+            <a:r>
+              <a:rPr lang="en-US" sz="1800" b="1" dirty="0" err="1" smtClean="0">
+                <a:latin typeface="Corbel"/>
+                <a:cs typeface="Corbel"/>
+              </a:rPr>
+              <a:t>cytometry</a:t>
+            </a:r>
+            <a:r>
+              <a:rPr lang="en-US" sz="1800" b="1" dirty="0" smtClean="0">
+                <a:latin typeface="Corbel"/>
+                <a:cs typeface="Corbel"/>
+              </a:rPr>
+              <a:t> data</a:t>
+            </a:r>
+            <a:endParaRPr lang="en-US" sz="1800" b="1" dirty="0">
+              <a:latin typeface="Corbel"/>
+              <a:cs typeface="Corbel"/>
+            </a:endParaRPr>
+          </a:p>
+        </p:txBody>
+      </p:sp>
     </p:spTree>
     <p:extLst>
       <p:ext uri="{BB962C8B-B14F-4D97-AF65-F5344CB8AC3E}">
@@ -5977,17 +6464,11 @@
             </a:endParaRPr>
           </a:p>
           <a:p>
-            <a:endParaRPr lang="en-US" dirty="0" smtClean="0">
-              <a:latin typeface="Arial"/>
-              <a:cs typeface="Arial"/>
-            </a:endParaRPr>
-          </a:p>
-          <a:p>
-            <a:r>
-              <a:rPr lang="en-US" dirty="0" smtClean="0">
-                <a:latin typeface="Arial"/>
-                <a:cs typeface="Arial"/>
-              </a:rPr>
+            <a:endParaRPr lang="en-US" dirty="0" smtClean="0"/>
+          </a:p>
+          <a:p>
+            <a:r>
+              <a:rPr lang="en-US" dirty="0" smtClean="0"/>
               <a:t>Select Analysis &gt; Principal Component Analysis to run PCA.</a:t>
             </a:r>
             <a:endParaRPr lang="en-US" dirty="0"/>

</xml_diff>

<commit_message>
updated tsne slide in tutorial
</commit_message>
<xml_diff>
--- a/docs/wishbone_tutorial.pptx
+++ b/docs/wishbone_tutorial.pptx
@@ -321,7 +321,7 @@
           <a:p>
             <a:fld id="{249D404F-B59E-3249-9345-AAE4E529CC32}" type="datetimeFigureOut">
               <a:rPr lang="en-US" smtClean="0"/>
-              <a:t>7/19/16</a:t>
+              <a:t>7/20/16</a:t>
             </a:fld>
             <a:endParaRPr lang="en-US"/>
           </a:p>
@@ -522,7 +522,7 @@
           <a:p>
             <a:fld id="{249D404F-B59E-3249-9345-AAE4E529CC32}" type="datetimeFigureOut">
               <a:rPr lang="en-US" smtClean="0"/>
-              <a:t>7/19/16</a:t>
+              <a:t>7/20/16</a:t>
             </a:fld>
             <a:endParaRPr lang="en-US"/>
           </a:p>
@@ -697,7 +697,7 @@
           <a:p>
             <a:fld id="{249D404F-B59E-3249-9345-AAE4E529CC32}" type="datetimeFigureOut">
               <a:rPr lang="en-US" smtClean="0"/>
-              <a:t>7/19/16</a:t>
+              <a:t>7/20/16</a:t>
             </a:fld>
             <a:endParaRPr lang="en-US"/>
           </a:p>
@@ -862,7 +862,7 @@
           <a:p>
             <a:fld id="{249D404F-B59E-3249-9345-AAE4E529CC32}" type="datetimeFigureOut">
               <a:rPr lang="en-US" smtClean="0"/>
-              <a:t>7/19/16</a:t>
+              <a:t>7/20/16</a:t>
             </a:fld>
             <a:endParaRPr lang="en-US"/>
           </a:p>
@@ -1110,7 +1110,7 @@
           <a:p>
             <a:fld id="{249D404F-B59E-3249-9345-AAE4E529CC32}" type="datetimeFigureOut">
               <a:rPr lang="en-US" smtClean="0"/>
-              <a:t>7/19/16</a:t>
+              <a:t>7/20/16</a:t>
             </a:fld>
             <a:endParaRPr lang="en-US"/>
           </a:p>
@@ -1428,7 +1428,7 @@
           <a:p>
             <a:fld id="{249D404F-B59E-3249-9345-AAE4E529CC32}" type="datetimeFigureOut">
               <a:rPr lang="en-US" smtClean="0"/>
-              <a:t>7/19/16</a:t>
+              <a:t>7/20/16</a:t>
             </a:fld>
             <a:endParaRPr lang="en-US"/>
           </a:p>
@@ -1894,7 +1894,7 @@
           <a:p>
             <a:fld id="{249D404F-B59E-3249-9345-AAE4E529CC32}" type="datetimeFigureOut">
               <a:rPr lang="en-US" smtClean="0"/>
-              <a:t>7/19/16</a:t>
+              <a:t>7/20/16</a:t>
             </a:fld>
             <a:endParaRPr lang="en-US"/>
           </a:p>
@@ -2042,7 +2042,7 @@
           <a:p>
             <a:fld id="{249D404F-B59E-3249-9345-AAE4E529CC32}" type="datetimeFigureOut">
               <a:rPr lang="en-US" smtClean="0"/>
-              <a:t>7/19/16</a:t>
+              <a:t>7/20/16</a:t>
             </a:fld>
             <a:endParaRPr lang="en-US"/>
           </a:p>
@@ -2132,7 +2132,7 @@
           <a:p>
             <a:fld id="{249D404F-B59E-3249-9345-AAE4E529CC32}" type="datetimeFigureOut">
               <a:rPr lang="en-US" smtClean="0"/>
-              <a:t>7/19/16</a:t>
+              <a:t>7/20/16</a:t>
             </a:fld>
             <a:endParaRPr lang="en-US"/>
           </a:p>
@@ -2406,7 +2406,7 @@
           <a:p>
             <a:fld id="{249D404F-B59E-3249-9345-AAE4E529CC32}" type="datetimeFigureOut">
               <a:rPr lang="en-US" smtClean="0"/>
-              <a:t>7/19/16</a:t>
+              <a:t>7/20/16</a:t>
             </a:fld>
             <a:endParaRPr lang="en-US"/>
           </a:p>
@@ -2712,7 +2712,7 @@
           <a:p>
             <a:fld id="{249D404F-B59E-3249-9345-AAE4E529CC32}" type="datetimeFigureOut">
               <a:rPr lang="en-US" smtClean="0"/>
-              <a:t>7/19/16</a:t>
+              <a:t>7/20/16</a:t>
             </a:fld>
             <a:endParaRPr lang="en-US"/>
           </a:p>
@@ -3010,7 +3010,7 @@
           <a:p>
             <a:fld id="{249D404F-B59E-3249-9345-AAE4E529CC32}" type="datetimeFigureOut">
               <a:rPr lang="en-US" smtClean="0"/>
-              <a:t>7/19/16</a:t>
+              <a:t>7/20/16</a:t>
             </a:fld>
             <a:endParaRPr lang="en-US"/>
           </a:p>
@@ -5873,21 +5873,7 @@
                 <a:latin typeface="Corbel"/>
                 <a:cs typeface="Corbel"/>
               </a:rPr>
-              <a:t> data, you will also be asked to choose </a:t>
-            </a:r>
-            <a:r>
-              <a:rPr lang="en-US" sz="2400" dirty="0" smtClean="0">
-                <a:latin typeface="Corbel"/>
-                <a:cs typeface="Corbel"/>
-              </a:rPr>
-              <a:t>whether or not to correct for library size among cells</a:t>
-            </a:r>
-            <a:r>
-              <a:rPr lang="en-US" sz="2400" dirty="0" smtClean="0">
-                <a:latin typeface="Corbel"/>
-                <a:cs typeface="Corbel"/>
-              </a:rPr>
-              <a:t>.</a:t>
+              <a:t> data, you will also be asked to choose whether or not to correct for library size among cells.</a:t>
             </a:r>
           </a:p>
           <a:p>
@@ -6179,7 +6165,7 @@
         </p:nvSpPr>
         <p:spPr>
           <a:xfrm>
-            <a:off x="5835486" y="4275274"/>
+            <a:off x="5835486" y="4302886"/>
             <a:ext cx="2651548" cy="450791"/>
           </a:xfrm>
           <a:prstGeom prst="rect">
@@ -6720,10 +6706,14 @@
               </a:buClr>
             </a:pPr>
             <a:r>
-              <a:rPr lang="en-US" dirty="0"/>
-              <a:t>Wishbone uses tSNE for data visualization</a:t>
-            </a:r>
-            <a:endParaRPr lang="en-US" sz="1800" i="1" dirty="0">
+              <a:rPr lang="en-US" sz="2350" dirty="0"/>
+              <a:t>Wishbone uses tSNE for data </a:t>
+            </a:r>
+            <a:r>
+              <a:rPr lang="en-US" sz="2350" dirty="0" smtClean="0"/>
+              <a:t>visualization</a:t>
+            </a:r>
+            <a:endParaRPr lang="en-US" sz="2350" i="1" dirty="0">
               <a:solidFill>
                 <a:srgbClr val="292934"/>
               </a:solidFill>
@@ -6736,7 +6726,90 @@
                 <a:srgbClr val="93A299"/>
               </a:buClr>
             </a:pPr>
-            <a:endParaRPr lang="en-US" sz="1800" i="1" dirty="0">
+            <a:r>
+              <a:rPr lang="en-US" sz="2350" dirty="0"/>
+              <a:t>Select Analysis &gt; tSNE to run tSNE.</a:t>
+            </a:r>
+          </a:p>
+          <a:p>
+            <a:pPr lvl="0">
+              <a:buClr>
+                <a:srgbClr val="93A299"/>
+              </a:buClr>
+            </a:pPr>
+            <a:r>
+              <a:rPr lang="en-US" sz="2350" dirty="0" smtClean="0">
+                <a:solidFill>
+                  <a:srgbClr val="292934"/>
+                </a:solidFill>
+                <a:cs typeface="Arial"/>
+              </a:rPr>
+              <a:t>If analyzing </a:t>
+            </a:r>
+            <a:r>
+              <a:rPr lang="en-US" sz="2350" dirty="0" err="1" smtClean="0">
+                <a:solidFill>
+                  <a:srgbClr val="292934"/>
+                </a:solidFill>
+                <a:cs typeface="Arial"/>
+              </a:rPr>
+              <a:t>sc-seq</a:t>
+            </a:r>
+            <a:r>
+              <a:rPr lang="en-US" sz="2350" dirty="0" smtClean="0">
+                <a:solidFill>
+                  <a:srgbClr val="292934"/>
+                </a:solidFill>
+                <a:cs typeface="Arial"/>
+              </a:rPr>
+              <a:t> data, </a:t>
+            </a:r>
+            <a:r>
+              <a:rPr lang="en-US" sz="2350" dirty="0" smtClean="0">
+                <a:solidFill>
+                  <a:srgbClr val="292934"/>
+                </a:solidFill>
+                <a:cs typeface="Arial"/>
+              </a:rPr>
+              <a:t>enter </a:t>
+            </a:r>
+            <a:r>
+              <a:rPr lang="en-US" sz="2350" dirty="0">
+                <a:solidFill>
+                  <a:srgbClr val="292934"/>
+                </a:solidFill>
+                <a:cs typeface="Arial"/>
+              </a:rPr>
+              <a:t>the number of </a:t>
+            </a:r>
+            <a:r>
+              <a:rPr lang="en-US" sz="2350" dirty="0" smtClean="0">
+                <a:solidFill>
+                  <a:srgbClr val="292934"/>
+                </a:solidFill>
+                <a:cs typeface="Arial"/>
+              </a:rPr>
+              <a:t>components </a:t>
+            </a:r>
+            <a:r>
+              <a:rPr lang="en-US" sz="2350" dirty="0" smtClean="0">
+                <a:solidFill>
+                  <a:srgbClr val="292934"/>
+                </a:solidFill>
+                <a:cs typeface="Arial"/>
+              </a:rPr>
+              <a:t>to </a:t>
+            </a:r>
+            <a:r>
+              <a:rPr lang="en-US" sz="2350" dirty="0">
+                <a:solidFill>
+                  <a:srgbClr val="292934"/>
+                </a:solidFill>
+                <a:cs typeface="Arial"/>
+              </a:rPr>
+              <a:t>use for tSNE. </a:t>
+            </a:r>
+            <a:endParaRPr lang="en-US" sz="2350" dirty="0" smtClean="0">
               <a:solidFill>
                 <a:srgbClr val="292934"/>
               </a:solidFill>
@@ -6744,49 +6817,69 @@
             </a:endParaRPr>
           </a:p>
           <a:p>
+            <a:pPr lvl="1">
+              <a:buClr>
+                <a:srgbClr val="93A299"/>
+              </a:buClr>
+            </a:pPr>
+            <a:r>
+              <a:rPr lang="en-US" sz="1900" dirty="0" smtClean="0">
+                <a:solidFill>
+                  <a:srgbClr val="292934"/>
+                </a:solidFill>
+                <a:cs typeface="Arial"/>
+              </a:rPr>
+              <a:t>Use </a:t>
+            </a:r>
+            <a:r>
+              <a:rPr lang="en-US" sz="1900" dirty="0">
+                <a:solidFill>
+                  <a:srgbClr val="292934"/>
+                </a:solidFill>
+                <a:cs typeface="Arial"/>
+              </a:rPr>
+              <a:t>the elbow method to choose the appropriate number of </a:t>
+            </a:r>
+            <a:r>
+              <a:rPr lang="en-US" sz="1900" dirty="0" smtClean="0">
+                <a:solidFill>
+                  <a:srgbClr val="292934"/>
+                </a:solidFill>
+                <a:cs typeface="Arial"/>
+              </a:rPr>
+              <a:t>components</a:t>
+            </a:r>
+          </a:p>
+          <a:p>
             <a:pPr lvl="0">
               <a:buClr>
                 <a:srgbClr val="93A299"/>
               </a:buClr>
             </a:pPr>
             <a:r>
-              <a:rPr lang="en-US" dirty="0"/>
-              <a:t>Select Analysis &gt; tSNE to run tSNE.</a:t>
-            </a:r>
-          </a:p>
-          <a:p>
-            <a:pPr lvl="0">
-              <a:buClr>
-                <a:srgbClr val="93A299"/>
-              </a:buClr>
-            </a:pPr>
-            <a:r>
-              <a:rPr lang="en-US" dirty="0">
+              <a:rPr lang="en-US" sz="2350" dirty="0">
                 <a:solidFill>
                   <a:srgbClr val="292934"/>
                 </a:solidFill>
                 <a:cs typeface="Arial"/>
               </a:rPr>
-              <a:t>You will be prompted to enter the number of </a:t>
-            </a:r>
-            <a:r>
-              <a:rPr lang="en-US" dirty="0" smtClean="0">
+              <a:t>For both data types, a perplexity value is also needed to run </a:t>
+            </a:r>
+            <a:r>
+              <a:rPr lang="en-US" sz="2350" dirty="0" err="1" smtClean="0">
                 <a:solidFill>
                   <a:srgbClr val="292934"/>
                 </a:solidFill>
                 <a:cs typeface="Arial"/>
               </a:rPr>
-              <a:t>components and perplexity </a:t>
-            </a:r>
-            <a:r>
-              <a:rPr lang="en-US" dirty="0">
-                <a:solidFill>
-                  <a:srgbClr val="292934"/>
-                </a:solidFill>
-                <a:cs typeface="Arial"/>
-              </a:rPr>
-              <a:t>to use for tSNE. </a:t>
-            </a:r>
+              <a:t>tSNE</a:t>
+            </a:r>
+            <a:endParaRPr lang="en-US" sz="2350" dirty="0" smtClean="0">
+              <a:solidFill>
+                <a:srgbClr val="292934"/>
+              </a:solidFill>
+              <a:cs typeface="Arial"/>
+            </a:endParaRPr>
           </a:p>
           <a:p>
             <a:pPr lvl="1">
@@ -6795,40 +6888,24 @@
               </a:buClr>
             </a:pPr>
             <a:r>
-              <a:rPr lang="en-US" dirty="0">
+              <a:rPr lang="en-US" sz="1900" dirty="0" smtClean="0">
                 <a:solidFill>
                   <a:srgbClr val="292934"/>
                 </a:solidFill>
                 <a:cs typeface="Arial"/>
               </a:rPr>
-              <a:t>Use the elbow method to choose the appropriate number of </a:t>
-            </a:r>
-            <a:r>
-              <a:rPr lang="en-US" dirty="0" smtClean="0">
+              <a:t>If </a:t>
+            </a:r>
+            <a:r>
+              <a:rPr lang="en-US" sz="1900" dirty="0" smtClean="0">
                 <a:solidFill>
                   <a:srgbClr val="292934"/>
                 </a:solidFill>
                 <a:cs typeface="Arial"/>
               </a:rPr>
-              <a:t>components</a:t>
-            </a:r>
-          </a:p>
-          <a:p>
-            <a:pPr lvl="1">
-              <a:buClr>
-                <a:srgbClr val="93A299"/>
-              </a:buClr>
-            </a:pPr>
-            <a:r>
-              <a:rPr lang="en-US" dirty="0" smtClean="0">
-                <a:solidFill>
-                  <a:srgbClr val="292934"/>
-                </a:solidFill>
-                <a:cs typeface="Arial"/>
-              </a:rPr>
-              <a:t>If the cell count is less than 100, the perplexity should be reduced</a:t>
-            </a:r>
-            <a:endParaRPr lang="en-US" dirty="0">
+              <a:t>the cell count is less than 100, the perplexity should be reduced</a:t>
+            </a:r>
+            <a:endParaRPr lang="en-US" sz="1900" dirty="0">
               <a:solidFill>
                 <a:srgbClr val="292934"/>
               </a:solidFill>
@@ -6859,14 +6936,431 @@
         </p:blipFill>
         <p:spPr>
           <a:xfrm>
-            <a:off x="4145339" y="4952795"/>
-            <a:ext cx="4812028" cy="1719708"/>
+            <a:off x="457200" y="5451539"/>
+            <a:ext cx="3336974" cy="1192558"/>
           </a:xfrm>
           <a:prstGeom prst="rect">
             <a:avLst/>
           </a:prstGeom>
         </p:spPr>
       </p:pic>
+      <p:pic>
+        <p:nvPicPr>
+          <p:cNvPr id="5" name="Picture 4" descr="Screen Shot 2016-07-20 at 10.30.03 AM.png"/>
+          <p:cNvPicPr>
+            <a:picLocks noChangeAspect="1"/>
+          </p:cNvPicPr>
+          <p:nvPr/>
+        </p:nvPicPr>
+        <p:blipFill>
+          <a:blip r:embed="rId3">
+            <a:extLst>
+              <a:ext uri="{28A0092B-C50C-407E-A947-70E740481C1C}">
+                <a14:useLocalDpi xmlns:a14="http://schemas.microsoft.com/office/drawing/2010/main" val="0"/>
+              </a:ext>
+            </a:extLst>
+          </a:blip>
+          <a:stretch>
+            <a:fillRect/>
+          </a:stretch>
+        </p:blipFill>
+        <p:spPr>
+          <a:xfrm>
+            <a:off x="5374139" y="5451539"/>
+            <a:ext cx="3312661" cy="1192558"/>
+          </a:xfrm>
+          <a:prstGeom prst="rect">
+            <a:avLst/>
+          </a:prstGeom>
+        </p:spPr>
+      </p:pic>
+      <p:sp>
+        <p:nvSpPr>
+          <p:cNvPr id="7" name="Content Placeholder 2"/>
+          <p:cNvSpPr txBox="1">
+            <a:spLocks/>
+          </p:cNvSpPr>
+          <p:nvPr/>
+        </p:nvSpPr>
+        <p:spPr>
+          <a:xfrm>
+            <a:off x="457200" y="5040741"/>
+            <a:ext cx="1420259" cy="450791"/>
+          </a:xfrm>
+          <a:prstGeom prst="rect">
+            <a:avLst/>
+          </a:prstGeom>
+        </p:spPr>
+        <p:txBody>
+          <a:bodyPr vert="horz" lIns="91440" tIns="45720" rIns="91440" bIns="45720" rtlCol="0">
+            <a:noAutofit/>
+          </a:bodyPr>
+          <a:lstStyle>
+            <a:lvl1pPr marL="342900" indent="-342900" algn="l" defTabSz="457200" rtl="0" eaLnBrk="1" latinLnBrk="0" hangingPunct="1">
+              <a:spcBef>
+                <a:spcPct val="20000"/>
+              </a:spcBef>
+              <a:buFont typeface="Arial"/>
+              <a:buChar char="•"/>
+              <a:defRPr sz="3200" kern="1200">
+                <a:solidFill>
+                  <a:schemeClr val="tx1"/>
+                </a:solidFill>
+                <a:latin typeface="+mn-lt"/>
+                <a:ea typeface="+mn-ea"/>
+                <a:cs typeface="+mn-cs"/>
+              </a:defRPr>
+            </a:lvl1pPr>
+            <a:lvl2pPr marL="742950" indent="-285750" algn="l" defTabSz="457200" rtl="0" eaLnBrk="1" latinLnBrk="0" hangingPunct="1">
+              <a:spcBef>
+                <a:spcPct val="20000"/>
+              </a:spcBef>
+              <a:buFont typeface="Arial"/>
+              <a:buChar char="–"/>
+              <a:defRPr sz="2800" kern="1200">
+                <a:solidFill>
+                  <a:schemeClr val="tx1"/>
+                </a:solidFill>
+                <a:latin typeface="+mn-lt"/>
+                <a:ea typeface="+mn-ea"/>
+                <a:cs typeface="+mn-cs"/>
+              </a:defRPr>
+            </a:lvl2pPr>
+            <a:lvl3pPr marL="1143000" indent="-228600" algn="l" defTabSz="457200" rtl="0" eaLnBrk="1" latinLnBrk="0" hangingPunct="1">
+              <a:spcBef>
+                <a:spcPct val="20000"/>
+              </a:spcBef>
+              <a:buFont typeface="Arial"/>
+              <a:buChar char="•"/>
+              <a:defRPr sz="2400" kern="1200">
+                <a:solidFill>
+                  <a:schemeClr val="tx1"/>
+                </a:solidFill>
+                <a:latin typeface="+mn-lt"/>
+                <a:ea typeface="+mn-ea"/>
+                <a:cs typeface="+mn-cs"/>
+              </a:defRPr>
+            </a:lvl3pPr>
+            <a:lvl4pPr marL="1600200" indent="-228600" algn="l" defTabSz="457200" rtl="0" eaLnBrk="1" latinLnBrk="0" hangingPunct="1">
+              <a:spcBef>
+                <a:spcPct val="20000"/>
+              </a:spcBef>
+              <a:buFont typeface="Arial"/>
+              <a:buChar char="–"/>
+              <a:defRPr sz="2000" kern="1200">
+                <a:solidFill>
+                  <a:schemeClr val="tx1"/>
+                </a:solidFill>
+                <a:latin typeface="+mn-lt"/>
+                <a:ea typeface="+mn-ea"/>
+                <a:cs typeface="+mn-cs"/>
+              </a:defRPr>
+            </a:lvl4pPr>
+            <a:lvl5pPr marL="2057400" indent="-228600" algn="l" defTabSz="457200" rtl="0" eaLnBrk="1" latinLnBrk="0" hangingPunct="1">
+              <a:spcBef>
+                <a:spcPct val="20000"/>
+              </a:spcBef>
+              <a:buFont typeface="Arial"/>
+              <a:buChar char="»"/>
+              <a:defRPr sz="2000" kern="1200">
+                <a:solidFill>
+                  <a:schemeClr val="tx1"/>
+                </a:solidFill>
+                <a:latin typeface="+mn-lt"/>
+                <a:ea typeface="+mn-ea"/>
+                <a:cs typeface="+mn-cs"/>
+              </a:defRPr>
+            </a:lvl5pPr>
+            <a:lvl6pPr marL="2514600" indent="-228600" algn="l" defTabSz="457200" rtl="0" eaLnBrk="1" latinLnBrk="0" hangingPunct="1">
+              <a:spcBef>
+                <a:spcPct val="20000"/>
+              </a:spcBef>
+              <a:buFont typeface="Arial"/>
+              <a:buChar char="•"/>
+              <a:defRPr sz="2000" kern="1200">
+                <a:solidFill>
+                  <a:schemeClr val="tx1"/>
+                </a:solidFill>
+                <a:latin typeface="+mn-lt"/>
+                <a:ea typeface="+mn-ea"/>
+                <a:cs typeface="+mn-cs"/>
+              </a:defRPr>
+            </a:lvl6pPr>
+            <a:lvl7pPr marL="2971800" indent="-228600" algn="l" defTabSz="457200" rtl="0" eaLnBrk="1" latinLnBrk="0" hangingPunct="1">
+              <a:spcBef>
+                <a:spcPct val="20000"/>
+              </a:spcBef>
+              <a:buFont typeface="Arial"/>
+              <a:buChar char="•"/>
+              <a:defRPr sz="2000" kern="1200">
+                <a:solidFill>
+                  <a:schemeClr val="tx1"/>
+                </a:solidFill>
+                <a:latin typeface="+mn-lt"/>
+                <a:ea typeface="+mn-ea"/>
+                <a:cs typeface="+mn-cs"/>
+              </a:defRPr>
+            </a:lvl7pPr>
+            <a:lvl8pPr marL="3429000" indent="-228600" algn="l" defTabSz="457200" rtl="0" eaLnBrk="1" latinLnBrk="0" hangingPunct="1">
+              <a:spcBef>
+                <a:spcPct val="20000"/>
+              </a:spcBef>
+              <a:buFont typeface="Arial"/>
+              <a:buChar char="•"/>
+              <a:defRPr sz="2000" kern="1200">
+                <a:solidFill>
+                  <a:schemeClr val="tx1"/>
+                </a:solidFill>
+                <a:latin typeface="+mn-lt"/>
+                <a:ea typeface="+mn-ea"/>
+                <a:cs typeface="+mn-cs"/>
+              </a:defRPr>
+            </a:lvl8pPr>
+            <a:lvl9pPr marL="3886200" indent="-228600" algn="l" defTabSz="457200" rtl="0" eaLnBrk="1" latinLnBrk="0" hangingPunct="1">
+              <a:spcBef>
+                <a:spcPct val="20000"/>
+              </a:spcBef>
+              <a:buFont typeface="Arial"/>
+              <a:buChar char="•"/>
+              <a:defRPr sz="2000" kern="1200">
+                <a:solidFill>
+                  <a:schemeClr val="tx1"/>
+                </a:solidFill>
+                <a:latin typeface="+mn-lt"/>
+                <a:ea typeface="+mn-ea"/>
+                <a:cs typeface="+mn-cs"/>
+              </a:defRPr>
+            </a:lvl9pPr>
+          </a:lstStyle>
+          <a:p>
+            <a:pPr marL="0" indent="0">
+              <a:buNone/>
+            </a:pPr>
+            <a:r>
+              <a:rPr lang="en-US" sz="1800" b="1" dirty="0" err="1">
+                <a:latin typeface="Corbel"/>
+                <a:cs typeface="Corbel"/>
+              </a:rPr>
+              <a:t>s</a:t>
+            </a:r>
+            <a:r>
+              <a:rPr lang="en-US" sz="1800" b="1" dirty="0" err="1" smtClean="0">
+                <a:latin typeface="Corbel"/>
+                <a:cs typeface="Corbel"/>
+              </a:rPr>
+              <a:t>c-seq</a:t>
+            </a:r>
+            <a:r>
+              <a:rPr lang="en-US" sz="1800" b="1" dirty="0" smtClean="0">
+                <a:latin typeface="Corbel"/>
+                <a:cs typeface="Corbel"/>
+              </a:rPr>
+              <a:t> data</a:t>
+            </a:r>
+            <a:endParaRPr lang="en-US" sz="1800" b="1" dirty="0">
+              <a:latin typeface="Corbel"/>
+              <a:cs typeface="Corbel"/>
+            </a:endParaRPr>
+          </a:p>
+        </p:txBody>
+      </p:sp>
+      <p:sp>
+        <p:nvSpPr>
+          <p:cNvPr id="8" name="Content Placeholder 2"/>
+          <p:cNvSpPr txBox="1">
+            <a:spLocks/>
+          </p:cNvSpPr>
+          <p:nvPr/>
+        </p:nvSpPr>
+        <p:spPr>
+          <a:xfrm>
+            <a:off x="5374139" y="5040741"/>
+            <a:ext cx="2651548" cy="450791"/>
+          </a:xfrm>
+          <a:prstGeom prst="rect">
+            <a:avLst/>
+          </a:prstGeom>
+        </p:spPr>
+        <p:txBody>
+          <a:bodyPr vert="horz" lIns="91440" tIns="45720" rIns="91440" bIns="45720" rtlCol="0">
+            <a:noAutofit/>
+          </a:bodyPr>
+          <a:lstStyle>
+            <a:lvl1pPr marL="342900" indent="-342900" algn="l" defTabSz="457200" rtl="0" eaLnBrk="1" latinLnBrk="0" hangingPunct="1">
+              <a:spcBef>
+                <a:spcPct val="20000"/>
+              </a:spcBef>
+              <a:buFont typeface="Arial"/>
+              <a:buChar char="•"/>
+              <a:defRPr sz="3200" kern="1200">
+                <a:solidFill>
+                  <a:schemeClr val="tx1"/>
+                </a:solidFill>
+                <a:latin typeface="+mn-lt"/>
+                <a:ea typeface="+mn-ea"/>
+                <a:cs typeface="+mn-cs"/>
+              </a:defRPr>
+            </a:lvl1pPr>
+            <a:lvl2pPr marL="742950" indent="-285750" algn="l" defTabSz="457200" rtl="0" eaLnBrk="1" latinLnBrk="0" hangingPunct="1">
+              <a:spcBef>
+                <a:spcPct val="20000"/>
+              </a:spcBef>
+              <a:buFont typeface="Arial"/>
+              <a:buChar char="–"/>
+              <a:defRPr sz="2800" kern="1200">
+                <a:solidFill>
+                  <a:schemeClr val="tx1"/>
+                </a:solidFill>
+                <a:latin typeface="+mn-lt"/>
+                <a:ea typeface="+mn-ea"/>
+                <a:cs typeface="+mn-cs"/>
+              </a:defRPr>
+            </a:lvl2pPr>
+            <a:lvl3pPr marL="1143000" indent="-228600" algn="l" defTabSz="457200" rtl="0" eaLnBrk="1" latinLnBrk="0" hangingPunct="1">
+              <a:spcBef>
+                <a:spcPct val="20000"/>
+              </a:spcBef>
+              <a:buFont typeface="Arial"/>
+              <a:buChar char="•"/>
+              <a:defRPr sz="2400" kern="1200">
+                <a:solidFill>
+                  <a:schemeClr val="tx1"/>
+                </a:solidFill>
+                <a:latin typeface="+mn-lt"/>
+                <a:ea typeface="+mn-ea"/>
+                <a:cs typeface="+mn-cs"/>
+              </a:defRPr>
+            </a:lvl3pPr>
+            <a:lvl4pPr marL="1600200" indent="-228600" algn="l" defTabSz="457200" rtl="0" eaLnBrk="1" latinLnBrk="0" hangingPunct="1">
+              <a:spcBef>
+                <a:spcPct val="20000"/>
+              </a:spcBef>
+              <a:buFont typeface="Arial"/>
+              <a:buChar char="–"/>
+              <a:defRPr sz="2000" kern="1200">
+                <a:solidFill>
+                  <a:schemeClr val="tx1"/>
+                </a:solidFill>
+                <a:latin typeface="+mn-lt"/>
+                <a:ea typeface="+mn-ea"/>
+                <a:cs typeface="+mn-cs"/>
+              </a:defRPr>
+            </a:lvl4pPr>
+            <a:lvl5pPr marL="2057400" indent="-228600" algn="l" defTabSz="457200" rtl="0" eaLnBrk="1" latinLnBrk="0" hangingPunct="1">
+              <a:spcBef>
+                <a:spcPct val="20000"/>
+              </a:spcBef>
+              <a:buFont typeface="Arial"/>
+              <a:buChar char="»"/>
+              <a:defRPr sz="2000" kern="1200">
+                <a:solidFill>
+                  <a:schemeClr val="tx1"/>
+                </a:solidFill>
+                <a:latin typeface="+mn-lt"/>
+                <a:ea typeface="+mn-ea"/>
+                <a:cs typeface="+mn-cs"/>
+              </a:defRPr>
+            </a:lvl5pPr>
+            <a:lvl6pPr marL="2514600" indent="-228600" algn="l" defTabSz="457200" rtl="0" eaLnBrk="1" latinLnBrk="0" hangingPunct="1">
+              <a:spcBef>
+                <a:spcPct val="20000"/>
+              </a:spcBef>
+              <a:buFont typeface="Arial"/>
+              <a:buChar char="•"/>
+              <a:defRPr sz="2000" kern="1200">
+                <a:solidFill>
+                  <a:schemeClr val="tx1"/>
+                </a:solidFill>
+                <a:latin typeface="+mn-lt"/>
+                <a:ea typeface="+mn-ea"/>
+                <a:cs typeface="+mn-cs"/>
+              </a:defRPr>
+            </a:lvl6pPr>
+            <a:lvl7pPr marL="2971800" indent="-228600" algn="l" defTabSz="457200" rtl="0" eaLnBrk="1" latinLnBrk="0" hangingPunct="1">
+              <a:spcBef>
+                <a:spcPct val="20000"/>
+              </a:spcBef>
+              <a:buFont typeface="Arial"/>
+              <a:buChar char="•"/>
+              <a:defRPr sz="2000" kern="1200">
+                <a:solidFill>
+                  <a:schemeClr val="tx1"/>
+                </a:solidFill>
+                <a:latin typeface="+mn-lt"/>
+                <a:ea typeface="+mn-ea"/>
+                <a:cs typeface="+mn-cs"/>
+              </a:defRPr>
+            </a:lvl7pPr>
+            <a:lvl8pPr marL="3429000" indent="-228600" algn="l" defTabSz="457200" rtl="0" eaLnBrk="1" latinLnBrk="0" hangingPunct="1">
+              <a:spcBef>
+                <a:spcPct val="20000"/>
+              </a:spcBef>
+              <a:buFont typeface="Arial"/>
+              <a:buChar char="•"/>
+              <a:defRPr sz="2000" kern="1200">
+                <a:solidFill>
+                  <a:schemeClr val="tx1"/>
+                </a:solidFill>
+                <a:latin typeface="+mn-lt"/>
+                <a:ea typeface="+mn-ea"/>
+                <a:cs typeface="+mn-cs"/>
+              </a:defRPr>
+            </a:lvl8pPr>
+            <a:lvl9pPr marL="3886200" indent="-228600" algn="l" defTabSz="457200" rtl="0" eaLnBrk="1" latinLnBrk="0" hangingPunct="1">
+              <a:spcBef>
+                <a:spcPct val="20000"/>
+              </a:spcBef>
+              <a:buFont typeface="Arial"/>
+              <a:buChar char="•"/>
+              <a:defRPr sz="2000" kern="1200">
+                <a:solidFill>
+                  <a:schemeClr val="tx1"/>
+                </a:solidFill>
+                <a:latin typeface="+mn-lt"/>
+                <a:ea typeface="+mn-ea"/>
+                <a:cs typeface="+mn-cs"/>
+              </a:defRPr>
+            </a:lvl9pPr>
+          </a:lstStyle>
+          <a:p>
+            <a:pPr marL="0" indent="0">
+              <a:buNone/>
+            </a:pPr>
+            <a:r>
+              <a:rPr lang="en-US" sz="1800" b="1" dirty="0">
+                <a:latin typeface="Corbel"/>
+                <a:cs typeface="Corbel"/>
+              </a:rPr>
+              <a:t>m</a:t>
+            </a:r>
+            <a:r>
+              <a:rPr lang="en-US" sz="1800" b="1" dirty="0" smtClean="0">
+                <a:latin typeface="Corbel"/>
+                <a:cs typeface="Corbel"/>
+              </a:rPr>
+              <a:t>ass </a:t>
+            </a:r>
+            <a:r>
+              <a:rPr lang="en-US" sz="1800" b="1" dirty="0" err="1" smtClean="0">
+                <a:latin typeface="Corbel"/>
+                <a:cs typeface="Corbel"/>
+              </a:rPr>
+              <a:t>cytometry</a:t>
+            </a:r>
+            <a:r>
+              <a:rPr lang="en-US" sz="1800" b="1" dirty="0" smtClean="0">
+                <a:latin typeface="Corbel"/>
+                <a:cs typeface="Corbel"/>
+              </a:rPr>
+              <a:t> data</a:t>
+            </a:r>
+            <a:endParaRPr lang="en-US" sz="1800" b="1" dirty="0">
+              <a:latin typeface="Corbel"/>
+              <a:cs typeface="Corbel"/>
+            </a:endParaRPr>
+          </a:p>
+        </p:txBody>
+      </p:sp>
     </p:spTree>
     <p:extLst>
       <p:ext uri="{BB962C8B-B14F-4D97-AF65-F5344CB8AC3E}">

</xml_diff>

<commit_message>
saving/loading pickled wb data added to tutorial
</commit_message>
<xml_diff>
--- a/docs/wishbone_tutorial.pptx
+++ b/docs/wishbone_tutorial.pptx
@@ -26,6 +26,7 @@
     <p:sldId id="272" r:id="rId20"/>
     <p:sldId id="275" r:id="rId21"/>
     <p:sldId id="273" r:id="rId22"/>
+    <p:sldId id="277" r:id="rId23"/>
   </p:sldIdLst>
   <p:sldSz cx="9144000" cy="6858000" type="screen4x3"/>
   <p:notesSz cx="6858000" cy="9144000"/>
@@ -5247,6 +5248,162 @@
   <p:clrMapOvr>
     <a:masterClrMapping/>
   </p:clrMapOvr>
+  <p:timing>
+    <p:tnLst>
+      <p:par>
+        <p:cTn xmlns:p14="http://schemas.microsoft.com/office/powerpoint/2010/main" id="1" dur="indefinite" restart="never" nodeType="tmRoot"/>
+      </p:par>
+    </p:tnLst>
+  </p:timing>
+</p:sld>
+</file>
+
+<file path=ppt/slides/slide22.xml><?xml version="1.0" encoding="utf-8"?>
+<p:sld xmlns:a="http://schemas.openxmlformats.org/drawingml/2006/main" xmlns:r="http://schemas.openxmlformats.org/officeDocument/2006/relationships" xmlns:p="http://schemas.openxmlformats.org/presentationml/2006/main">
+  <p:cSld>
+    <p:spTree>
+      <p:nvGrpSpPr>
+        <p:cNvPr id="1" name=""/>
+        <p:cNvGrpSpPr/>
+        <p:nvPr/>
+      </p:nvGrpSpPr>
+      <p:grpSpPr>
+        <a:xfrm>
+          <a:off x="0" y="0"/>
+          <a:ext cx="0" cy="0"/>
+          <a:chOff x="0" y="0"/>
+          <a:chExt cx="0" cy="0"/>
+        </a:xfrm>
+      </p:grpSpPr>
+      <p:sp>
+        <p:nvSpPr>
+          <p:cNvPr id="2" name="Title 1"/>
+          <p:cNvSpPr>
+            <a:spLocks noGrp="1"/>
+          </p:cNvSpPr>
+          <p:nvPr>
+            <p:ph type="title"/>
+          </p:nvPr>
+        </p:nvSpPr>
+        <p:spPr/>
+        <p:txBody>
+          <a:bodyPr/>
+          <a:lstStyle/>
+          <a:p>
+            <a:r>
+              <a:rPr lang="en-US" dirty="0" smtClean="0"/>
+              <a:t>Saving data</a:t>
+            </a:r>
+            <a:endParaRPr lang="en-US" dirty="0"/>
+          </a:p>
+        </p:txBody>
+      </p:sp>
+      <p:sp>
+        <p:nvSpPr>
+          <p:cNvPr id="3" name="Content Placeholder 2"/>
+          <p:cNvSpPr>
+            <a:spLocks noGrp="1"/>
+          </p:cNvSpPr>
+          <p:nvPr>
+            <p:ph idx="1"/>
+          </p:nvPr>
+        </p:nvSpPr>
+        <p:spPr/>
+        <p:txBody>
+          <a:bodyPr/>
+          <a:lstStyle/>
+          <a:p>
+            <a:r>
+              <a:rPr lang="en-US" dirty="0" smtClean="0"/>
+              <a:t>All of your data and analysis can be saved and reloaded into Wishbone at a later time. </a:t>
+            </a:r>
+          </a:p>
+          <a:p>
+            <a:r>
+              <a:rPr lang="en-US" dirty="0" smtClean="0"/>
+              <a:t>Select File &gt; Save data to save your current progress as a pickle file.</a:t>
+            </a:r>
+            <a:endParaRPr lang="en-US" dirty="0"/>
+          </a:p>
+        </p:txBody>
+      </p:sp>
+      <p:pic>
+        <p:nvPicPr>
+          <p:cNvPr id="4" name="Picture 3" descr="Screen Shot 2016-07-20 at 3.47.29 PM.png"/>
+          <p:cNvPicPr>
+            <a:picLocks noChangeAspect="1"/>
+          </p:cNvPicPr>
+          <p:nvPr/>
+        </p:nvPicPr>
+        <p:blipFill>
+          <a:blip r:embed="rId2">
+            <a:extLst>
+              <a:ext uri="{28A0092B-C50C-407E-A947-70E740481C1C}">
+                <a14:useLocalDpi xmlns:a14="http://schemas.microsoft.com/office/drawing/2010/main" val="0"/>
+              </a:ext>
+            </a:extLst>
+          </a:blip>
+          <a:stretch>
+            <a:fillRect/>
+          </a:stretch>
+        </p:blipFill>
+        <p:spPr>
+          <a:xfrm>
+            <a:off x="457200" y="3426456"/>
+            <a:ext cx="4261470" cy="3174795"/>
+          </a:xfrm>
+          <a:prstGeom prst="rect">
+            <a:avLst/>
+          </a:prstGeom>
+        </p:spPr>
+      </p:pic>
+      <p:pic>
+        <p:nvPicPr>
+          <p:cNvPr id="5" name="Picture 4" descr="Screen Shot 2016-07-20 at 3.43.54 PM.png"/>
+          <p:cNvPicPr>
+            <a:picLocks noChangeAspect="1"/>
+          </p:cNvPicPr>
+          <p:nvPr/>
+        </p:nvPicPr>
+        <p:blipFill>
+          <a:blip r:embed="rId3">
+            <a:extLst>
+              <a:ext uri="{28A0092B-C50C-407E-A947-70E740481C1C}">
+                <a14:useLocalDpi xmlns:a14="http://schemas.microsoft.com/office/drawing/2010/main" val="0"/>
+              </a:ext>
+            </a:extLst>
+          </a:blip>
+          <a:stretch>
+            <a:fillRect/>
+          </a:stretch>
+        </p:blipFill>
+        <p:spPr>
+          <a:xfrm>
+            <a:off x="5386986" y="3426456"/>
+            <a:ext cx="2927083" cy="1332375"/>
+          </a:xfrm>
+          <a:prstGeom prst="rect">
+            <a:avLst/>
+          </a:prstGeom>
+        </p:spPr>
+      </p:pic>
+    </p:spTree>
+    <p:extLst>
+      <p:ext uri="{BB962C8B-B14F-4D97-AF65-F5344CB8AC3E}">
+        <p14:creationId xmlns:p14="http://schemas.microsoft.com/office/powerpoint/2010/main" val="3925612570"/>
+      </p:ext>
+    </p:extLst>
+  </p:cSld>
+  <p:clrMapOvr>
+    <a:masterClrMapping/>
+  </p:clrMapOvr>
+  <p:timing>
+    <p:tnLst>
+      <p:par>
+        <p:cTn xmlns:p14="http://schemas.microsoft.com/office/powerpoint/2010/main" id="1" dur="indefinite" restart="never" nodeType="tmRoot"/>
+      </p:par>
+    </p:tnLst>
+  </p:timing>
 </p:sld>
 </file>
 
@@ -5578,7 +5735,11 @@
             </a:r>
             <a:r>
               <a:rPr lang="en-US" dirty="0" smtClean="0"/>
-              <a:t> file containing single cell RNA-</a:t>
+              <a:t> </a:t>
+            </a:r>
+            <a:r>
+              <a:rPr lang="en-US" dirty="0" smtClean="0"/>
+              <a:t>file containing single cell RNA-</a:t>
             </a:r>
             <a:r>
               <a:rPr lang="en-US" dirty="0" err="1" smtClean="0"/>
@@ -5586,7 +5747,23 @@
             </a:r>
             <a:r>
               <a:rPr lang="en-US" dirty="0" smtClean="0"/>
-              <a:t> data</a:t>
+              <a:t> </a:t>
+            </a:r>
+            <a:r>
+              <a:rPr lang="en-US" dirty="0" smtClean="0"/>
+              <a:t>data, a fcs file containin</a:t>
+            </a:r>
+            <a:r>
+              <a:rPr lang="en-US" dirty="0" smtClean="0"/>
+              <a:t>g mass </a:t>
+            </a:r>
+            <a:r>
+              <a:rPr lang="en-US" dirty="0" err="1" smtClean="0"/>
+              <a:t>cytometry</a:t>
+            </a:r>
+            <a:r>
+              <a:rPr lang="en-US" dirty="0" smtClean="0"/>
+              <a:t> data, or a pickle file from a previous Wishbone session.</a:t>
             </a:r>
             <a:endParaRPr lang="en-US" dirty="0"/>
           </a:p>
@@ -5594,7 +5771,7 @@
       </p:sp>
       <p:pic>
         <p:nvPicPr>
-          <p:cNvPr id="4" name="Picture 3" descr="wb_gui_1.png"/>
+          <p:cNvPr id="5" name="Picture 4" descr="Screen Shot 2016-07-20 at 3.43.08 PM.png"/>
           <p:cNvPicPr>
             <a:picLocks noChangeAspect="1"/>
           </p:cNvPicPr>
@@ -5614,8 +5791,8 @@
         </p:blipFill>
         <p:spPr>
           <a:xfrm>
-            <a:off x="2721916" y="3382695"/>
-            <a:ext cx="5964884" cy="2950257"/>
+            <a:off x="2721916" y="3553457"/>
+            <a:ext cx="5964884" cy="2923543"/>
           </a:xfrm>
           <a:prstGeom prst="rect">
             <a:avLst/>
@@ -6762,16 +6939,7 @@
                 </a:solidFill>
                 <a:cs typeface="Arial"/>
               </a:rPr>
-              <a:t> data, </a:t>
-            </a:r>
-            <a:r>
-              <a:rPr lang="en-US" sz="2350" dirty="0" smtClean="0">
-                <a:solidFill>
-                  <a:srgbClr val="292934"/>
-                </a:solidFill>
-                <a:cs typeface="Arial"/>
-              </a:rPr>
-              <a:t>enter </a:t>
+              <a:t> data, enter </a:t>
             </a:r>
             <a:r>
               <a:rPr lang="en-US" sz="2350" dirty="0">
@@ -6789,16 +6957,7 @@
                 </a:solidFill>
                 <a:cs typeface="Arial"/>
               </a:rPr>
-              <a:t>components </a:t>
-            </a:r>
-            <a:r>
-              <a:rPr lang="en-US" sz="2350" dirty="0" smtClean="0">
-                <a:solidFill>
-                  <a:srgbClr val="292934"/>
-                </a:solidFill>
-                <a:cs typeface="Arial"/>
-              </a:rPr>
-              <a:t>to </a:t>
+              <a:t>components to </a:t>
             </a:r>
             <a:r>
               <a:rPr lang="en-US" sz="2350" dirty="0">
@@ -6894,16 +7053,7 @@
                 </a:solidFill>
                 <a:cs typeface="Arial"/>
               </a:rPr>
-              <a:t>If </a:t>
-            </a:r>
-            <a:r>
-              <a:rPr lang="en-US" sz="1900" dirty="0" smtClean="0">
-                <a:solidFill>
-                  <a:srgbClr val="292934"/>
-                </a:solidFill>
-                <a:cs typeface="Arial"/>
-              </a:rPr>
-              <a:t>the cell count is less than 100, the perplexity should be reduced</a:t>
+              <a:t>If the cell count is less than 100, the perplexity should be reduced</a:t>
             </a:r>
             <a:endParaRPr lang="en-US" sz="1900" dirty="0">
               <a:solidFill>

</xml_diff>

<commit_message>
Minor updates to Wishbone tutorial
</commit_message>
<xml_diff>
--- a/docs/wishbone_tutorial.pptx
+++ b/docs/wishbone_tutorial.pptx
@@ -5285,7 +5285,12 @@
             <p:ph type="title"/>
           </p:nvPr>
         </p:nvSpPr>
-        <p:spPr/>
+        <p:spPr>
+          <a:xfrm>
+            <a:off x="457200" y="284892"/>
+            <a:ext cx="8229600" cy="990600"/>
+          </a:xfrm>
+        </p:spPr>
         <p:txBody>
           <a:bodyPr/>
           <a:lstStyle/>
@@ -5308,7 +5313,12 @@
             <p:ph idx="1"/>
           </p:nvPr>
         </p:nvSpPr>
-        <p:spPr/>
+        <p:spPr>
+          <a:xfrm>
+            <a:off x="457200" y="1296468"/>
+            <a:ext cx="8229600" cy="4876800"/>
+          </a:xfrm>
+        </p:spPr>
         <p:txBody>
           <a:bodyPr/>
           <a:lstStyle/>
@@ -5321,7 +5331,21 @@
           <a:p>
             <a:r>
               <a:rPr lang="en-US" dirty="0" smtClean="0"/>
-              <a:t>Select File &gt; Save data to save your current progress as a pickle file.</a:t>
+              <a:t>Select File &gt; Save data to save your current progress as a pickle </a:t>
+            </a:r>
+            <a:r>
+              <a:rPr lang="en-US" dirty="0" smtClean="0"/>
+              <a:t>file</a:t>
+            </a:r>
+            <a:r>
+              <a:rPr lang="en-US" dirty="0" smtClean="0"/>
+              <a:t>; the data can be saved at any stage of analysis</a:t>
+            </a:r>
+          </a:p>
+          <a:p>
+            <a:r>
+              <a:rPr lang="en-US" dirty="0" smtClean="0"/>
+              <a:t>The saved pickle file can be loaded using File &gt; Load data </a:t>
             </a:r>
             <a:endParaRPr lang="en-US" dirty="0"/>
           </a:p>
@@ -5349,7 +5373,7 @@
         </p:blipFill>
         <p:spPr>
           <a:xfrm>
-            <a:off x="457200" y="3426456"/>
+            <a:off x="457200" y="3688770"/>
             <a:ext cx="4261470" cy="3174795"/>
           </a:xfrm>
           <a:prstGeom prst="rect">
@@ -5379,7 +5403,7 @@
         </p:blipFill>
         <p:spPr>
           <a:xfrm>
-            <a:off x="5386986" y="3426456"/>
+            <a:off x="5386986" y="3688770"/>
             <a:ext cx="2927083" cy="1332375"/>
           </a:xfrm>
           <a:prstGeom prst="rect">
@@ -5735,11 +5759,7 @@
             </a:r>
             <a:r>
               <a:rPr lang="en-US" dirty="0" smtClean="0"/>
-              <a:t> </a:t>
-            </a:r>
-            <a:r>
-              <a:rPr lang="en-US" dirty="0" smtClean="0"/>
-              <a:t>file containing single cell RNA-</a:t>
+              <a:t> file containing single cell RNA-</a:t>
             </a:r>
             <a:r>
               <a:rPr lang="en-US" dirty="0" err="1" smtClean="0"/>
@@ -5747,15 +5767,7 @@
             </a:r>
             <a:r>
               <a:rPr lang="en-US" dirty="0" smtClean="0"/>
-              <a:t> </a:t>
-            </a:r>
-            <a:r>
-              <a:rPr lang="en-US" dirty="0" smtClean="0"/>
-              <a:t>data, a fcs file containin</a:t>
-            </a:r>
-            <a:r>
-              <a:rPr lang="en-US" dirty="0" smtClean="0"/>
-              <a:t>g mass </a:t>
+              <a:t> data, a fcs file containing mass </a:t>
             </a:r>
             <a:r>
               <a:rPr lang="en-US" dirty="0" err="1" smtClean="0"/>

</xml_diff>